<commit_message>
Updated slides and demo
</commit_message>
<xml_diff>
--- a/kotlin/kotlin.pptx
+++ b/kotlin/kotlin.pptx
@@ -5,19 +5,22 @@
     <p:sldMasterId id="2147483684" r:id="rId1"/>
   </p:sldMasterIdLst>
   <p:notesMasterIdLst>
-    <p:notesMasterId r:id="rId9"/>
+    <p:notesMasterId r:id="rId12"/>
   </p:notesMasterIdLst>
   <p:handoutMasterIdLst>
-    <p:handoutMasterId r:id="rId10"/>
+    <p:handoutMasterId r:id="rId13"/>
   </p:handoutMasterIdLst>
   <p:sldIdLst>
     <p:sldId id="256" r:id="rId2"/>
     <p:sldId id="257" r:id="rId3"/>
     <p:sldId id="258" r:id="rId4"/>
-    <p:sldId id="259" r:id="rId5"/>
-    <p:sldId id="260" r:id="rId6"/>
-    <p:sldId id="261" r:id="rId7"/>
+    <p:sldId id="260" r:id="rId5"/>
+    <p:sldId id="261" r:id="rId6"/>
+    <p:sldId id="265" r:id="rId7"/>
     <p:sldId id="262" r:id="rId8"/>
+    <p:sldId id="266" r:id="rId9"/>
+    <p:sldId id="264" r:id="rId10"/>
+    <p:sldId id="263" r:id="rId11"/>
   </p:sldIdLst>
   <p:sldSz cx="9144000" cy="6858000" type="screen4x3"/>
   <p:notesSz cx="6985000" cy="9271000"/>
@@ -1040,8 +1043,66 @@
             </a:pPr>
             <a:r>
               <a:rPr lang="en-US" baseline="0" dirty="0" smtClean="0"/>
-              <a:t>Only some of the common complains against Java</a:t>
-            </a:r>
+              <a:t>Only some of the common complains against </a:t>
+            </a:r>
+            <a:r>
+              <a:rPr lang="en-US" baseline="0" dirty="0" smtClean="0"/>
+              <a:t>Java</a:t>
+            </a:r>
+          </a:p>
+          <a:p>
+            <a:pPr marL="0" indent="0">
+              <a:buFontTx/>
+              <a:buNone/>
+            </a:pPr>
+            <a:endParaRPr lang="en-US" baseline="0" dirty="0" smtClean="0"/>
+          </a:p>
+          <a:p>
+            <a:r>
+              <a:rPr lang="en-US" dirty="0" smtClean="0"/>
+              <a:t>Overall,</a:t>
+            </a:r>
+            <a:r>
+              <a:rPr lang="en-US" baseline="0" dirty="0" smtClean="0"/>
+              <a:t> we desire</a:t>
+            </a:r>
+          </a:p>
+          <a:p>
+            <a:pPr marL="171450" indent="-171450">
+              <a:buFontTx/>
+              <a:buChar char="-"/>
+            </a:pPr>
+            <a:r>
+              <a:rPr lang="en-US" baseline="0" dirty="0" smtClean="0"/>
+              <a:t>Maintainable code-base (brevity helps here)</a:t>
+            </a:r>
+          </a:p>
+          <a:p>
+            <a:pPr marL="171450" indent="-171450">
+              <a:buFontTx/>
+              <a:buChar char="-"/>
+            </a:pPr>
+            <a:r>
+              <a:rPr lang="en-US" baseline="0" dirty="0" smtClean="0"/>
+              <a:t>Early error detection (move as much of the error checking into the compiler)</a:t>
+            </a:r>
+          </a:p>
+          <a:p>
+            <a:pPr marL="171450" indent="-171450">
+              <a:buFontTx/>
+              <a:buChar char="-"/>
+            </a:pPr>
+            <a:r>
+              <a:rPr lang="en-US" baseline="0" dirty="0" smtClean="0"/>
+              <a:t>Tool support</a:t>
+            </a:r>
+          </a:p>
+          <a:p>
+            <a:pPr marL="0" indent="0">
+              <a:buFontTx/>
+              <a:buNone/>
+            </a:pPr>
+            <a:endParaRPr lang="en-US" baseline="0" dirty="0" smtClean="0"/>
           </a:p>
         </p:txBody>
       </p:sp>
@@ -1127,11 +1188,28 @@
           <a:p>
             <a:r>
               <a:rPr lang="en-US" dirty="0" smtClean="0"/>
-              <a:t>Overall,</a:t>
+              <a:t>JVM language made by </a:t>
+            </a:r>
+            <a:r>
+              <a:rPr lang="en-US" dirty="0" err="1" smtClean="0"/>
+              <a:t>JetBrains</a:t>
+            </a:r>
+            <a:r>
+              <a:rPr lang="en-US" dirty="0" smtClean="0"/>
+              <a:t>.</a:t>
             </a:r>
             <a:r>
               <a:rPr lang="en-US" baseline="0" dirty="0" smtClean="0"/>
-              <a:t> we desire</a:t>
+              <a:t>  Started development in 2010, with the 1.0 Beta released last November.  1.0 was released in Feb.</a:t>
+            </a:r>
+          </a:p>
+          <a:p>
+            <a:endParaRPr lang="en-US" baseline="0" dirty="0" smtClean="0"/>
+          </a:p>
+          <a:p>
+            <a:r>
+              <a:rPr lang="en-US" baseline="0" dirty="0" smtClean="0"/>
+              <a:t>Benefits:</a:t>
             </a:r>
           </a:p>
           <a:p>
@@ -1141,7 +1219,7 @@
             </a:pPr>
             <a:r>
               <a:rPr lang="en-US" baseline="0" dirty="0" smtClean="0"/>
-              <a:t>Maintainable code-base (brevity helps here)</a:t>
+              <a:t>From 1.0 will be backward compatible</a:t>
             </a:r>
           </a:p>
           <a:p>
@@ -1151,7 +1229,7 @@
             </a:pPr>
             <a:r>
               <a:rPr lang="en-US" baseline="0" dirty="0" smtClean="0"/>
-              <a:t>Early error detection (move as much of the error checking into the compiler)</a:t>
+              <a:t>Interoperable with Java</a:t>
             </a:r>
           </a:p>
           <a:p>
@@ -1161,7 +1239,17 @@
             </a:pPr>
             <a:r>
               <a:rPr lang="en-US" baseline="0" dirty="0" smtClean="0"/>
-              <a:t>Tool support</a:t>
+              <a:t>Java 6 Compatible</a:t>
+            </a:r>
+          </a:p>
+          <a:p>
+            <a:pPr marL="171450" indent="-171450">
+              <a:buFontTx/>
+              <a:buChar char="-"/>
+            </a:pPr>
+            <a:r>
+              <a:rPr lang="en-US" baseline="0" dirty="0" smtClean="0"/>
+              <a:t>Leverages Java’s libraries for the most part.</a:t>
             </a:r>
           </a:p>
           <a:p>
@@ -1175,6 +1263,60 @@
             <a:pPr marL="0" indent="0">
               <a:buFontTx/>
               <a:buNone/>
+            </a:pPr>
+            <a:r>
+              <a:rPr lang="en-US" baseline="0" dirty="0" smtClean="0"/>
+              <a:t>Clarity / Pragmatism – not about invention, but helping engineers do their job.</a:t>
+            </a:r>
+          </a:p>
+          <a:p>
+            <a:pPr marL="0" indent="0">
+              <a:buFontTx/>
+              <a:buNone/>
+            </a:pPr>
+            <a:endParaRPr lang="en-US" baseline="0" dirty="0" smtClean="0"/>
+          </a:p>
+          <a:p>
+            <a:pPr marL="0" indent="0">
+              <a:buFontTx/>
+              <a:buNone/>
+            </a:pPr>
+            <a:endParaRPr lang="en-US" baseline="0" dirty="0" smtClean="0"/>
+          </a:p>
+          <a:p>
+            <a:pPr marL="0" indent="0">
+              <a:buFontTx/>
+              <a:buNone/>
+            </a:pPr>
+            <a:r>
+              <a:rPr lang="en-US" baseline="0" dirty="0" smtClean="0"/>
+              <a:t>Citation:  </a:t>
+            </a:r>
+          </a:p>
+          <a:p>
+            <a:pPr marL="171450" indent="-171450">
+              <a:buFontTx/>
+              <a:buChar char="-"/>
+            </a:pPr>
+            <a:r>
+              <a:rPr lang="en-US" baseline="0" dirty="0" smtClean="0"/>
+              <a:t>http://blog.jetbrains.com/kotlin/2016/02/kotlin-1-0-released-pragmatic-language-for-jvm-and-android/</a:t>
+            </a:r>
+          </a:p>
+          <a:p>
+            <a:pPr marL="171450" indent="-171450">
+              <a:buFontTx/>
+              <a:buChar char="-"/>
+            </a:pPr>
+            <a:r>
+              <a:rPr lang="en-US" dirty="0" smtClean="0"/>
+              <a:t>http://blog.jetbrains.com/kotlin/2014/10/making-platform-interop-even-smoother/</a:t>
+            </a:r>
+          </a:p>
+          <a:p>
+            <a:pPr marL="171450" indent="-171450">
+              <a:buFontTx/>
+              <a:buChar char="-"/>
             </a:pPr>
             <a:endParaRPr lang="en-US" dirty="0"/>
           </a:p>
@@ -1206,7 +1348,7 @@
     </p:spTree>
     <p:extLst>
       <p:ext uri="{BB962C8B-B14F-4D97-AF65-F5344CB8AC3E}">
-        <p14:creationId xmlns:p14="http://schemas.microsoft.com/office/powerpoint/2010/main" val="843908197"/>
+        <p14:creationId xmlns:p14="http://schemas.microsoft.com/office/powerpoint/2010/main" val="4154112042"/>
       </p:ext>
     </p:extLst>
   </p:cSld>
@@ -1260,40 +1402,13 @@
           <a:bodyPr/>
           <a:lstStyle/>
           <a:p>
-            <a:r>
-              <a:rPr lang="en-US" dirty="0" smtClean="0"/>
-              <a:t>JVM language made by </a:t>
-            </a:r>
-            <a:r>
-              <a:rPr lang="en-US" dirty="0" err="1" smtClean="0"/>
-              <a:t>JetBrains</a:t>
-            </a:r>
-            <a:r>
-              <a:rPr lang="en-US" dirty="0" smtClean="0"/>
-              <a:t>.</a:t>
-            </a:r>
-            <a:r>
-              <a:rPr lang="en-US" baseline="0" dirty="0" smtClean="0"/>
-              <a:t>  Started development in 2010, with the 1.0 Beta released last November.  1.0 was released in Feb.</a:t>
-            </a:r>
-          </a:p>
-          <a:p>
-            <a:endParaRPr lang="en-US" baseline="0" dirty="0" smtClean="0"/>
-          </a:p>
-          <a:p>
-            <a:r>
-              <a:rPr lang="en-US" baseline="0" dirty="0" smtClean="0"/>
-              <a:t>Benefits:</a:t>
-            </a:r>
-          </a:p>
-          <a:p>
             <a:pPr marL="171450" indent="-171450">
               <a:buFontTx/>
               <a:buChar char="-"/>
             </a:pPr>
             <a:r>
-              <a:rPr lang="en-US" baseline="0" dirty="0" smtClean="0"/>
-              <a:t>From 1.0 will be backward compatible</a:t>
+              <a:rPr lang="en-US" dirty="0" smtClean="0"/>
+              <a:t>Converter for all at once</a:t>
             </a:r>
           </a:p>
           <a:p>
@@ -1302,96 +1417,13 @@
               <a:buChar char="-"/>
             </a:pPr>
             <a:r>
+              <a:rPr lang="en-US" dirty="0" smtClean="0"/>
+              <a:t>Interoperability</a:t>
+            </a:r>
+            <a:r>
               <a:rPr lang="en-US" baseline="0" dirty="0" smtClean="0"/>
-              <a:t>Interoperable with Java</a:t>
-            </a:r>
-          </a:p>
-          <a:p>
-            <a:pPr marL="171450" indent="-171450">
-              <a:buFontTx/>
-              <a:buChar char="-"/>
-            </a:pPr>
-            <a:r>
-              <a:rPr lang="en-US" baseline="0" dirty="0" smtClean="0"/>
-              <a:t>Java 6 Compatible</a:t>
-            </a:r>
-          </a:p>
-          <a:p>
-            <a:pPr marL="171450" indent="-171450">
-              <a:buFontTx/>
-              <a:buChar char="-"/>
-            </a:pPr>
-            <a:r>
-              <a:rPr lang="en-US" baseline="0" dirty="0" smtClean="0"/>
-              <a:t>Leverages Java’s libraries for the most part.</a:t>
-            </a:r>
-          </a:p>
-          <a:p>
-            <a:pPr marL="171450" indent="-171450">
-              <a:buFontTx/>
-              <a:buChar char="-"/>
-            </a:pPr>
-            <a:endParaRPr lang="en-US" baseline="0" dirty="0" smtClean="0"/>
-          </a:p>
-          <a:p>
-            <a:pPr marL="0" indent="0">
-              <a:buFontTx/>
-              <a:buNone/>
-            </a:pPr>
-            <a:r>
-              <a:rPr lang="en-US" baseline="0" dirty="0" smtClean="0"/>
-              <a:t>Clarity / Pragmatism – not about invention, but helping engineers do their job.</a:t>
-            </a:r>
-          </a:p>
-          <a:p>
-            <a:pPr marL="0" indent="0">
-              <a:buFontTx/>
-              <a:buNone/>
-            </a:pPr>
-            <a:endParaRPr lang="en-US" baseline="0" dirty="0" smtClean="0"/>
-          </a:p>
-          <a:p>
-            <a:pPr marL="0" indent="0">
-              <a:buFontTx/>
-              <a:buNone/>
-            </a:pPr>
-            <a:endParaRPr lang="en-US" baseline="0" dirty="0" smtClean="0"/>
-          </a:p>
-          <a:p>
-            <a:pPr marL="0" indent="0">
-              <a:buFontTx/>
-              <a:buNone/>
-            </a:pPr>
-            <a:r>
-              <a:rPr lang="en-US" baseline="0" dirty="0" smtClean="0"/>
-              <a:t>Citation:  </a:t>
-            </a:r>
-          </a:p>
-          <a:p>
-            <a:pPr marL="171450" indent="-171450">
-              <a:buFontTx/>
-              <a:buChar char="-"/>
-            </a:pPr>
-            <a:r>
-              <a:rPr lang="en-US" baseline="0" dirty="0" smtClean="0"/>
-              <a:t>http://blog.jetbrains.com/kotlin/2016/02/kotlin-1-0-released-pragmatic-language-for-jvm-and-android/</a:t>
-            </a:r>
-          </a:p>
-          <a:p>
-            <a:pPr marL="171450" indent="-171450">
-              <a:buFontTx/>
-              <a:buChar char="-"/>
-            </a:pPr>
-            <a:r>
-              <a:rPr lang="en-US" dirty="0" smtClean="0"/>
-              <a:t>http://blog.jetbrains.com/kotlin/2014/10/making-platform-interop-even-smoother/</a:t>
-            </a:r>
-          </a:p>
-          <a:p>
-            <a:pPr marL="171450" indent="-171450">
-              <a:buFontTx/>
-              <a:buChar char="-"/>
-            </a:pPr>
+              <a:t> supports a module-at-a-time transition.</a:t>
+            </a:r>
             <a:endParaRPr lang="en-US" dirty="0"/>
           </a:p>
         </p:txBody>
@@ -1413,7 +1445,7 @@
           <a:p>
             <a:fld id="{FFC089F1-0D39-44BA-8DE0-5CF19D200129}" type="slidenum">
               <a:rPr lang="en-US" smtClean="0"/>
-              <a:t>5</a:t>
+              <a:t>8</a:t>
             </a:fld>
             <a:endParaRPr lang="en-US"/>
           </a:p>
@@ -1422,7 +1454,184 @@
     </p:spTree>
     <p:extLst>
       <p:ext uri="{BB962C8B-B14F-4D97-AF65-F5344CB8AC3E}">
-        <p14:creationId xmlns:p14="http://schemas.microsoft.com/office/powerpoint/2010/main" val="4154112042"/>
+        <p14:creationId xmlns:p14="http://schemas.microsoft.com/office/powerpoint/2010/main" val="1917973548"/>
+      </p:ext>
+    </p:extLst>
+  </p:cSld>
+  <p:clrMapOvr>
+    <a:masterClrMapping/>
+  </p:clrMapOvr>
+</p:notes>
+</file>
+
+<file path=ppt/notesSlides/notesSlide6.xml><?xml version="1.0" encoding="utf-8"?>
+<p:notes xmlns:a="http://schemas.openxmlformats.org/drawingml/2006/main" xmlns:r="http://schemas.openxmlformats.org/officeDocument/2006/relationships" xmlns:p="http://schemas.openxmlformats.org/presentationml/2006/main">
+  <p:cSld>
+    <p:spTree>
+      <p:nvGrpSpPr>
+        <p:cNvPr id="1" name=""/>
+        <p:cNvGrpSpPr/>
+        <p:nvPr/>
+      </p:nvGrpSpPr>
+      <p:grpSpPr>
+        <a:xfrm>
+          <a:off x="0" y="0"/>
+          <a:ext cx="0" cy="0"/>
+          <a:chOff x="0" y="0"/>
+          <a:chExt cx="0" cy="0"/>
+        </a:xfrm>
+      </p:grpSpPr>
+      <p:sp>
+        <p:nvSpPr>
+          <p:cNvPr id="2" name="Slide Image Placeholder 1"/>
+          <p:cNvSpPr>
+            <a:spLocks noGrp="1" noRot="1" noChangeAspect="1"/>
+          </p:cNvSpPr>
+          <p:nvPr>
+            <p:ph type="sldImg"/>
+          </p:nvPr>
+        </p:nvSpPr>
+        <p:spPr/>
+      </p:sp>
+      <p:sp>
+        <p:nvSpPr>
+          <p:cNvPr id="3" name="Notes Placeholder 2"/>
+          <p:cNvSpPr>
+            <a:spLocks noGrp="1"/>
+          </p:cNvSpPr>
+          <p:nvPr>
+            <p:ph type="body" idx="1"/>
+          </p:nvPr>
+        </p:nvSpPr>
+        <p:spPr/>
+        <p:txBody>
+          <a:bodyPr/>
+          <a:lstStyle/>
+          <a:p>
+            <a:endParaRPr lang="en-US" baseline="0" dirty="0" smtClean="0"/>
+          </a:p>
+        </p:txBody>
+      </p:sp>
+      <p:sp>
+        <p:nvSpPr>
+          <p:cNvPr id="4" name="Slide Number Placeholder 3"/>
+          <p:cNvSpPr>
+            <a:spLocks noGrp="1"/>
+          </p:cNvSpPr>
+          <p:nvPr>
+            <p:ph type="sldNum" sz="quarter" idx="10"/>
+          </p:nvPr>
+        </p:nvSpPr>
+        <p:spPr/>
+        <p:txBody>
+          <a:bodyPr/>
+          <a:lstStyle/>
+          <a:p>
+            <a:fld id="{FFC089F1-0D39-44BA-8DE0-5CF19D200129}" type="slidenum">
+              <a:rPr lang="en-US" smtClean="0">
+                <a:solidFill>
+                  <a:prstClr val="black"/>
+                </a:solidFill>
+              </a:rPr>
+              <a:pPr/>
+              <a:t>9</a:t>
+            </a:fld>
+            <a:endParaRPr lang="en-US">
+              <a:solidFill>
+                <a:prstClr val="black"/>
+              </a:solidFill>
+            </a:endParaRPr>
+          </a:p>
+        </p:txBody>
+      </p:sp>
+    </p:spTree>
+    <p:extLst>
+      <p:ext uri="{BB962C8B-B14F-4D97-AF65-F5344CB8AC3E}">
+        <p14:creationId xmlns:p14="http://schemas.microsoft.com/office/powerpoint/2010/main" val="4158958388"/>
+      </p:ext>
+    </p:extLst>
+  </p:cSld>
+  <p:clrMapOvr>
+    <a:masterClrMapping/>
+  </p:clrMapOvr>
+</p:notes>
+</file>
+
+<file path=ppt/notesSlides/notesSlide7.xml><?xml version="1.0" encoding="utf-8"?>
+<p:notes xmlns:a="http://schemas.openxmlformats.org/drawingml/2006/main" xmlns:r="http://schemas.openxmlformats.org/officeDocument/2006/relationships" xmlns:p="http://schemas.openxmlformats.org/presentationml/2006/main">
+  <p:cSld>
+    <p:spTree>
+      <p:nvGrpSpPr>
+        <p:cNvPr id="1" name=""/>
+        <p:cNvGrpSpPr/>
+        <p:nvPr/>
+      </p:nvGrpSpPr>
+      <p:grpSpPr>
+        <a:xfrm>
+          <a:off x="0" y="0"/>
+          <a:ext cx="0" cy="0"/>
+          <a:chOff x="0" y="0"/>
+          <a:chExt cx="0" cy="0"/>
+        </a:xfrm>
+      </p:grpSpPr>
+      <p:sp>
+        <p:nvSpPr>
+          <p:cNvPr id="2" name="Slide Image Placeholder 1"/>
+          <p:cNvSpPr>
+            <a:spLocks noGrp="1" noRot="1" noChangeAspect="1"/>
+          </p:cNvSpPr>
+          <p:nvPr>
+            <p:ph type="sldImg"/>
+          </p:nvPr>
+        </p:nvSpPr>
+        <p:spPr/>
+      </p:sp>
+      <p:sp>
+        <p:nvSpPr>
+          <p:cNvPr id="3" name="Notes Placeholder 2"/>
+          <p:cNvSpPr>
+            <a:spLocks noGrp="1"/>
+          </p:cNvSpPr>
+          <p:nvPr>
+            <p:ph type="body" idx="1"/>
+          </p:nvPr>
+        </p:nvSpPr>
+        <p:spPr/>
+        <p:txBody>
+          <a:bodyPr/>
+          <a:lstStyle/>
+          <a:p>
+            <a:endParaRPr lang="en-US" dirty="0"/>
+          </a:p>
+        </p:txBody>
+      </p:sp>
+      <p:sp>
+        <p:nvSpPr>
+          <p:cNvPr id="4" name="Slide Number Placeholder 3"/>
+          <p:cNvSpPr>
+            <a:spLocks noGrp="1"/>
+          </p:cNvSpPr>
+          <p:nvPr>
+            <p:ph type="sldNum" sz="quarter" idx="10"/>
+          </p:nvPr>
+        </p:nvSpPr>
+        <p:spPr/>
+        <p:txBody>
+          <a:bodyPr/>
+          <a:lstStyle/>
+          <a:p>
+            <a:fld id="{FFC089F1-0D39-44BA-8DE0-5CF19D200129}" type="slidenum">
+              <a:rPr lang="en-US" smtClean="0"/>
+              <a:t>10</a:t>
+            </a:fld>
+            <a:endParaRPr lang="en-US"/>
+          </a:p>
+        </p:txBody>
+      </p:sp>
+    </p:spTree>
+    <p:extLst>
+      <p:ext uri="{BB962C8B-B14F-4D97-AF65-F5344CB8AC3E}">
+        <p14:creationId xmlns:p14="http://schemas.microsoft.com/office/powerpoint/2010/main" val="3265321608"/>
       </p:ext>
     </p:extLst>
   </p:cSld>
@@ -4231,6 +4440,279 @@
       </p:par>
     </p:tnLst>
   </p:timing>
+</p:sld>
+</file>
+
+<file path=ppt/slides/slide10.xml><?xml version="1.0" encoding="utf-8"?>
+<p:sld xmlns:a="http://schemas.openxmlformats.org/drawingml/2006/main" xmlns:r="http://schemas.openxmlformats.org/officeDocument/2006/relationships" xmlns:p="http://schemas.openxmlformats.org/presentationml/2006/main">
+  <p:cSld>
+    <p:spTree>
+      <p:nvGrpSpPr>
+        <p:cNvPr id="1" name=""/>
+        <p:cNvGrpSpPr/>
+        <p:nvPr/>
+      </p:nvGrpSpPr>
+      <p:grpSpPr>
+        <a:xfrm>
+          <a:off x="0" y="0"/>
+          <a:ext cx="0" cy="0"/>
+          <a:chOff x="0" y="0"/>
+          <a:chExt cx="0" cy="0"/>
+        </a:xfrm>
+      </p:grpSpPr>
+      <p:sp>
+        <p:nvSpPr>
+          <p:cNvPr id="9" name="Content Placeholder 8"/>
+          <p:cNvSpPr>
+            <a:spLocks noGrp="1"/>
+          </p:cNvSpPr>
+          <p:nvPr>
+            <p:ph idx="1"/>
+          </p:nvPr>
+        </p:nvSpPr>
+        <p:spPr>
+          <a:xfrm>
+            <a:off x="457200" y="685800"/>
+            <a:ext cx="8229600" cy="5562600"/>
+          </a:xfrm>
+        </p:spPr>
+        <p:txBody>
+          <a:bodyPr>
+            <a:normAutofit/>
+          </a:bodyPr>
+          <a:lstStyle/>
+          <a:p>
+            <a:pPr marL="0" indent="0" algn="ctr">
+              <a:buNone/>
+            </a:pPr>
+            <a:r>
+              <a:rPr lang="en-US" dirty="0" smtClean="0"/>
+              <a:t>Please attribute to Ian J. De Silva</a:t>
+            </a:r>
+          </a:p>
+          <a:p>
+            <a:pPr marL="0" indent="0" algn="ctr">
+              <a:buNone/>
+            </a:pPr>
+            <a:endParaRPr lang="en-US" dirty="0"/>
+          </a:p>
+          <a:p>
+            <a:pPr marL="0" indent="0" algn="ctr">
+              <a:buNone/>
+            </a:pPr>
+            <a:endParaRPr lang="en-US" dirty="0" smtClean="0"/>
+          </a:p>
+          <a:p>
+            <a:pPr marL="0" indent="0" algn="ctr">
+              <a:buNone/>
+            </a:pPr>
+            <a:endParaRPr lang="en-US" dirty="0"/>
+          </a:p>
+          <a:p>
+            <a:pPr marL="0" indent="0" algn="ctr">
+              <a:buNone/>
+            </a:pPr>
+            <a:endParaRPr lang="en-US" dirty="0" smtClean="0"/>
+          </a:p>
+          <a:p>
+            <a:pPr marL="0" indent="0" algn="ctr">
+              <a:buNone/>
+            </a:pPr>
+            <a:endParaRPr lang="en-US" dirty="0"/>
+          </a:p>
+          <a:p>
+            <a:pPr marL="0" indent="0" algn="ctr">
+              <a:buNone/>
+            </a:pPr>
+            <a:r>
+              <a:rPr lang="en-US" sz="2400" dirty="0" smtClean="0"/>
+              <a:t>Except where otherwise noted, this </a:t>
+            </a:r>
+            <a:r>
+              <a:rPr lang="en-US" sz="2400" dirty="0"/>
+              <a:t>work is licensed under </a:t>
+            </a:r>
+            <a:r>
+              <a:rPr lang="en-US" sz="2400" dirty="0" smtClean="0"/>
+              <a:t>the</a:t>
+            </a:r>
+          </a:p>
+          <a:p>
+            <a:pPr marL="0" indent="0" algn="ctr">
+              <a:buNone/>
+            </a:pPr>
+            <a:r>
+              <a:rPr lang="en-US" dirty="0" smtClean="0"/>
+              <a:t>Creative </a:t>
+            </a:r>
+            <a:r>
+              <a:rPr lang="en-US" dirty="0"/>
+              <a:t>Commons Attribution 4.0 </a:t>
+            </a:r>
+            <a:r>
+              <a:rPr lang="en-US" dirty="0" smtClean="0"/>
+              <a:t/>
+            </a:r>
+            <a:br>
+              <a:rPr lang="en-US" dirty="0" smtClean="0"/>
+            </a:br>
+            <a:r>
+              <a:rPr lang="en-US" dirty="0" smtClean="0"/>
+              <a:t>International License</a:t>
+            </a:r>
+          </a:p>
+          <a:p>
+            <a:pPr marL="0" indent="0" algn="ctr">
+              <a:buNone/>
+            </a:pPr>
+            <a:r>
+              <a:rPr lang="en-US" sz="2400" dirty="0"/>
+              <a:t>http://creativecommons.org/licenses/by/4.0/</a:t>
+            </a:r>
+          </a:p>
+        </p:txBody>
+      </p:sp>
+      <p:sp>
+        <p:nvSpPr>
+          <p:cNvPr id="7" name="Slide Number Placeholder 6"/>
+          <p:cNvSpPr>
+            <a:spLocks noGrp="1"/>
+          </p:cNvSpPr>
+          <p:nvPr>
+            <p:ph type="sldNum" sz="quarter" idx="12"/>
+          </p:nvPr>
+        </p:nvSpPr>
+        <p:spPr/>
+        <p:txBody>
+          <a:bodyPr/>
+          <a:lstStyle/>
+          <a:p>
+            <a:fld id="{1DD2B937-2451-42FD-890C-5AA83BEDFA1C}" type="slidenum">
+              <a:rPr lang="en-US" smtClean="0"/>
+              <a:t>10</a:t>
+            </a:fld>
+            <a:endParaRPr lang="en-US"/>
+          </a:p>
+        </p:txBody>
+      </p:sp>
+      <p:pic>
+        <p:nvPicPr>
+          <p:cNvPr id="1026" name="Picture 2" descr="http://mirrors.creativecommons.org/presskit/icons/cc.large.png"/>
+          <p:cNvPicPr>
+            <a:picLocks noChangeAspect="1" noChangeArrowheads="1"/>
+          </p:cNvPicPr>
+          <p:nvPr/>
+        </p:nvPicPr>
+        <p:blipFill>
+          <a:blip r:embed="rId3">
+            <a:duotone>
+              <a:prstClr val="black"/>
+              <a:srgbClr val="FFFFFF">
+                <a:tint val="45000"/>
+                <a:satMod val="400000"/>
+              </a:srgbClr>
+            </a:duotone>
+            <a:extLst>
+              <a:ext uri="{28A0092B-C50C-407E-A947-70E740481C1C}">
+                <a14:useLocalDpi xmlns:a14="http://schemas.microsoft.com/office/drawing/2010/main" val="0"/>
+              </a:ext>
+            </a:extLst>
+          </a:blip>
+          <a:srcRect/>
+          <a:stretch>
+            <a:fillRect/>
+          </a:stretch>
+        </p:blipFill>
+        <p:spPr bwMode="auto">
+          <a:xfrm>
+            <a:off x="2286000" y="1673225"/>
+            <a:ext cx="1984375" cy="1984375"/>
+          </a:xfrm>
+          <a:prstGeom prst="rect">
+            <a:avLst/>
+          </a:prstGeom>
+          <a:noFill/>
+        </p:spPr>
+      </p:pic>
+      <p:pic>
+        <p:nvPicPr>
+          <p:cNvPr id="1028" name="Picture 4" descr="http://mirrors.creativecommons.org/presskit/icons/by.large.png"/>
+          <p:cNvPicPr>
+            <a:picLocks noChangeAspect="1" noChangeArrowheads="1"/>
+          </p:cNvPicPr>
+          <p:nvPr/>
+        </p:nvPicPr>
+        <p:blipFill>
+          <a:blip r:embed="rId4">
+            <a:duotone>
+              <a:prstClr val="black"/>
+              <a:srgbClr val="FFFFFF">
+                <a:tint val="45000"/>
+                <a:satMod val="400000"/>
+              </a:srgbClr>
+            </a:duotone>
+            <a:extLst>
+              <a:ext uri="{28A0092B-C50C-407E-A947-70E740481C1C}">
+                <a14:useLocalDpi xmlns:a14="http://schemas.microsoft.com/office/drawing/2010/main" val="0"/>
+              </a:ext>
+            </a:extLst>
+          </a:blip>
+          <a:srcRect/>
+          <a:stretch>
+            <a:fillRect/>
+          </a:stretch>
+        </p:blipFill>
+        <p:spPr bwMode="auto">
+          <a:xfrm>
+            <a:off x="5108575" y="1673225"/>
+            <a:ext cx="1981200" cy="1981200"/>
+          </a:xfrm>
+          <a:prstGeom prst="rect">
+            <a:avLst/>
+          </a:prstGeom>
+          <a:noFill/>
+        </p:spPr>
+      </p:pic>
+      <p:sp>
+        <p:nvSpPr>
+          <p:cNvPr id="10" name="TextBox 9"/>
+          <p:cNvSpPr txBox="1"/>
+          <p:nvPr/>
+        </p:nvSpPr>
+        <p:spPr>
+          <a:xfrm>
+            <a:off x="152400" y="6429473"/>
+            <a:ext cx="2551917" cy="307777"/>
+          </a:xfrm>
+          <a:prstGeom prst="rect">
+            <a:avLst/>
+          </a:prstGeom>
+          <a:noFill/>
+        </p:spPr>
+        <p:txBody>
+          <a:bodyPr wrap="none" rtlCol="0">
+            <a:spAutoFit/>
+          </a:bodyPr>
+          <a:lstStyle/>
+          <a:p>
+            <a:r>
+              <a:rPr lang="en-US" sz="1400" dirty="0" smtClean="0"/>
+              <a:t>Copyright © 2016, Ian J. De Silva</a:t>
+            </a:r>
+            <a:endParaRPr lang="en-US" sz="1400" dirty="0"/>
+          </a:p>
+        </p:txBody>
+      </p:sp>
+    </p:spTree>
+    <p:extLst>
+      <p:ext uri="{BB962C8B-B14F-4D97-AF65-F5344CB8AC3E}">
+        <p14:creationId xmlns:p14="http://schemas.microsoft.com/office/powerpoint/2010/main" val="3465879923"/>
+      </p:ext>
+    </p:extLst>
+  </p:cSld>
+  <p:clrMapOvr>
+    <a:masterClrMapping/>
+  </p:clrMapOvr>
 </p:sld>
 </file>
 
@@ -5318,26 +5800,11 @@
           <a:bodyPr/>
           <a:lstStyle/>
           <a:p>
-            <a:endParaRPr lang="en-US"/>
-          </a:p>
-        </p:txBody>
-      </p:sp>
-      <p:sp>
-        <p:nvSpPr>
-          <p:cNvPr id="3" name="Content Placeholder 2"/>
-          <p:cNvSpPr>
-            <a:spLocks noGrp="1"/>
-          </p:cNvSpPr>
-          <p:nvPr>
-            <p:ph idx="1"/>
-          </p:nvPr>
-        </p:nvSpPr>
-        <p:spPr/>
-        <p:txBody>
-          <a:bodyPr/>
-          <a:lstStyle/>
-          <a:p>
-            <a:endParaRPr lang="en-US"/>
+            <a:r>
+              <a:rPr lang="en-US" dirty="0" err="1" smtClean="0"/>
+              <a:t>Kotlin</a:t>
+            </a:r>
+            <a:endParaRPr lang="en-US" dirty="0"/>
           </a:p>
         </p:txBody>
       </p:sp>
@@ -5359,89 +5826,6 @@
             <a:fld id="{1DD2B937-2451-42FD-890C-5AA83BEDFA1C}" type="slidenum">
               <a:rPr lang="en-US" smtClean="0"/>
               <a:t>4</a:t>
-            </a:fld>
-            <a:endParaRPr lang="en-US"/>
-          </a:p>
-        </p:txBody>
-      </p:sp>
-    </p:spTree>
-    <p:extLst>
-      <p:ext uri="{BB962C8B-B14F-4D97-AF65-F5344CB8AC3E}">
-        <p14:creationId xmlns:p14="http://schemas.microsoft.com/office/powerpoint/2010/main" val="3595977937"/>
-      </p:ext>
-    </p:extLst>
-  </p:cSld>
-  <p:clrMapOvr>
-    <a:masterClrMapping/>
-  </p:clrMapOvr>
-  <p:timing>
-    <p:tnLst>
-      <p:par>
-        <p:cTn id="1" dur="indefinite" restart="never" nodeType="tmRoot"/>
-      </p:par>
-    </p:tnLst>
-  </p:timing>
-</p:sld>
-</file>
-
-<file path=ppt/slides/slide5.xml><?xml version="1.0" encoding="utf-8"?>
-<p:sld xmlns:a="http://schemas.openxmlformats.org/drawingml/2006/main" xmlns:r="http://schemas.openxmlformats.org/officeDocument/2006/relationships" xmlns:p="http://schemas.openxmlformats.org/presentationml/2006/main">
-  <p:cSld>
-    <p:spTree>
-      <p:nvGrpSpPr>
-        <p:cNvPr id="1" name=""/>
-        <p:cNvGrpSpPr/>
-        <p:nvPr/>
-      </p:nvGrpSpPr>
-      <p:grpSpPr>
-        <a:xfrm>
-          <a:off x="0" y="0"/>
-          <a:ext cx="0" cy="0"/>
-          <a:chOff x="0" y="0"/>
-          <a:chExt cx="0" cy="0"/>
-        </a:xfrm>
-      </p:grpSpPr>
-      <p:sp>
-        <p:nvSpPr>
-          <p:cNvPr id="2" name="Title 1"/>
-          <p:cNvSpPr>
-            <a:spLocks noGrp="1"/>
-          </p:cNvSpPr>
-          <p:nvPr>
-            <p:ph type="title"/>
-          </p:nvPr>
-        </p:nvSpPr>
-        <p:spPr/>
-        <p:txBody>
-          <a:bodyPr/>
-          <a:lstStyle/>
-          <a:p>
-            <a:r>
-              <a:rPr lang="en-US" dirty="0" err="1" smtClean="0"/>
-              <a:t>Kotlin</a:t>
-            </a:r>
-            <a:endParaRPr lang="en-US" dirty="0"/>
-          </a:p>
-        </p:txBody>
-      </p:sp>
-      <p:sp>
-        <p:nvSpPr>
-          <p:cNvPr id="4" name="Slide Number Placeholder 3"/>
-          <p:cNvSpPr>
-            <a:spLocks noGrp="1"/>
-          </p:cNvSpPr>
-          <p:nvPr>
-            <p:ph type="sldNum" sz="quarter" idx="12"/>
-          </p:nvPr>
-        </p:nvSpPr>
-        <p:spPr/>
-        <p:txBody>
-          <a:bodyPr/>
-          <a:lstStyle/>
-          <a:p>
-            <a:fld id="{1DD2B937-2451-42FD-890C-5AA83BEDFA1C}" type="slidenum">
-              <a:rPr lang="en-US" smtClean="0"/>
-              <a:t>5</a:t>
             </a:fld>
             <a:endParaRPr lang="en-US"/>
           </a:p>
@@ -5638,7 +6022,7 @@
 </p:sld>
 </file>
 
-<file path=ppt/slides/slide6.xml><?xml version="1.0" encoding="utf-8"?>
+<file path=ppt/slides/slide5.xml><?xml version="1.0" encoding="utf-8"?>
 <p:sld xmlns:a="http://schemas.openxmlformats.org/drawingml/2006/main" xmlns:r="http://schemas.openxmlformats.org/officeDocument/2006/relationships" xmlns:p="http://schemas.openxmlformats.org/presentationml/2006/main">
   <p:cSld>
     <p:spTree>
@@ -5672,7 +6056,11 @@
           <a:p>
             <a:r>
               <a:rPr lang="en-US" dirty="0" smtClean="0"/>
-              <a:t>hello</a:t>
+              <a:t>hello </a:t>
+            </a:r>
+            <a:r>
+              <a:rPr lang="en-US" dirty="0" err="1" smtClean="0"/>
+              <a:t>Kotlin</a:t>
             </a:r>
             <a:endParaRPr lang="en-US" dirty="0"/>
           </a:p>
@@ -5695,7 +6083,7 @@
           <a:p>
             <a:fld id="{1DD2B937-2451-42FD-890C-5AA83BEDFA1C}" type="slidenum">
               <a:rPr lang="en-US" smtClean="0"/>
-              <a:t>6</a:t>
+              <a:t>5</a:t>
             </a:fld>
             <a:endParaRPr lang="en-US"/>
           </a:p>
@@ -6933,6 +7321,1682 @@
 </p:sld>
 </file>
 
+<file path=ppt/slides/slide6.xml><?xml version="1.0" encoding="utf-8"?>
+<p:sld xmlns:a="http://schemas.openxmlformats.org/drawingml/2006/main" xmlns:r="http://schemas.openxmlformats.org/officeDocument/2006/relationships" xmlns:p="http://schemas.openxmlformats.org/presentationml/2006/main">
+  <p:cSld>
+    <p:spTree>
+      <p:nvGrpSpPr>
+        <p:cNvPr id="1" name=""/>
+        <p:cNvGrpSpPr/>
+        <p:nvPr/>
+      </p:nvGrpSpPr>
+      <p:grpSpPr>
+        <a:xfrm>
+          <a:off x="0" y="0"/>
+          <a:ext cx="0" cy="0"/>
+          <a:chOff x="0" y="0"/>
+          <a:chExt cx="0" cy="0"/>
+        </a:xfrm>
+      </p:grpSpPr>
+      <p:sp>
+        <p:nvSpPr>
+          <p:cNvPr id="17" name="Rectangle 4"/>
+          <p:cNvSpPr>
+            <a:spLocks noChangeArrowheads="1"/>
+          </p:cNvSpPr>
+          <p:nvPr/>
+        </p:nvSpPr>
+        <p:spPr bwMode="auto">
+          <a:xfrm>
+            <a:off x="457200" y="1569809"/>
+            <a:ext cx="8153400" cy="4708981"/>
+          </a:xfrm>
+          <a:prstGeom prst="rect">
+            <a:avLst/>
+          </a:prstGeom>
+          <a:solidFill>
+            <a:srgbClr val="2B2B2B"/>
+          </a:solidFill>
+          <a:ln>
+            <a:noFill/>
+          </a:ln>
+          <a:effectLst/>
+          <a:extLst>
+            <a:ext uri="{91240B29-F687-4F45-9708-019B960494DF}">
+              <a14:hiddenLine xmlns:a14="http://schemas.microsoft.com/office/drawing/2010/main" w="9525">
+                <a:solidFill>
+                  <a:schemeClr val="tx1"/>
+                </a:solidFill>
+                <a:miter lim="800000"/>
+                <a:headEnd/>
+                <a:tailEnd/>
+              </a14:hiddenLine>
+            </a:ext>
+            <a:ext uri="{AF507438-7753-43E0-B8FC-AC1667EBCBE1}">
+              <a14:hiddenEffects xmlns:a14="http://schemas.microsoft.com/office/drawing/2010/main">
+                <a:effectLst>
+                  <a:outerShdw dist="35921" dir="2700000" algn="ctr" rotWithShape="0">
+                    <a:schemeClr val="bg2"/>
+                  </a:outerShdw>
+                </a:effectLst>
+              </a14:hiddenEffects>
+            </a:ext>
+          </a:extLst>
+        </p:spPr>
+        <p:txBody>
+          <a:bodyPr vert="horz" wrap="square" lIns="91440" tIns="45720" rIns="91440" bIns="45720" numCol="1" anchor="ctr" anchorCtr="0" compatLnSpc="1">
+            <a:prstTxWarp prst="textNoShape">
+              <a:avLst/>
+            </a:prstTxWarp>
+            <a:spAutoFit/>
+          </a:bodyPr>
+          <a:lstStyle/>
+          <a:p>
+            <a:pPr marL="0" marR="0" lvl="0" indent="0" algn="l" defTabSz="914400" rtl="0" eaLnBrk="0" fontAlgn="base" latinLnBrk="0" hangingPunct="0">
+              <a:lnSpc>
+                <a:spcPct val="100000"/>
+              </a:lnSpc>
+              <a:spcBef>
+                <a:spcPct val="0"/>
+              </a:spcBef>
+              <a:spcAft>
+                <a:spcPct val="0"/>
+              </a:spcAft>
+              <a:buClrTx/>
+              <a:buSzTx/>
+              <a:buFontTx/>
+              <a:buNone/>
+              <a:tabLst/>
+            </a:pPr>
+            <a:r>
+              <a:rPr kumimoji="0" lang="en-US" altLang="en-US" sz="2000" b="0" i="0" u="none" strike="noStrike" cap="none" normalizeH="0" baseline="0" dirty="0" smtClean="0">
+                <a:ln>
+                  <a:noFill/>
+                </a:ln>
+                <a:solidFill>
+                  <a:srgbClr val="CC7832"/>
+                </a:solidFill>
+                <a:effectLst/>
+                <a:latin typeface="Courier New" panose="02070309020205020404" pitchFamily="49" charset="0"/>
+                <a:cs typeface="Courier New" panose="02070309020205020404" pitchFamily="49" charset="0"/>
+              </a:rPr>
+              <a:t>fun </a:t>
+            </a:r>
+            <a:r>
+              <a:rPr kumimoji="0" lang="en-US" altLang="en-US" sz="2000" b="0" i="0" u="none" strike="noStrike" cap="none" normalizeH="0" baseline="0" dirty="0" err="1" smtClean="0">
+                <a:ln>
+                  <a:noFill/>
+                </a:ln>
+                <a:solidFill>
+                  <a:srgbClr val="FFC66D"/>
+                </a:solidFill>
+                <a:effectLst/>
+                <a:latin typeface="Courier New" panose="02070309020205020404" pitchFamily="49" charset="0"/>
+                <a:cs typeface="Courier New" panose="02070309020205020404" pitchFamily="49" charset="0"/>
+              </a:rPr>
+              <a:t>parseInt</a:t>
+            </a:r>
+            <a:r>
+              <a:rPr kumimoji="0" lang="en-US" altLang="en-US" sz="2000" b="0" i="0" u="none" strike="noStrike" cap="none" normalizeH="0" baseline="0" dirty="0" smtClean="0">
+                <a:ln>
+                  <a:noFill/>
+                </a:ln>
+                <a:solidFill>
+                  <a:srgbClr val="A9B7C6"/>
+                </a:solidFill>
+                <a:effectLst/>
+                <a:latin typeface="Courier New" panose="02070309020205020404" pitchFamily="49" charset="0"/>
+                <a:cs typeface="Courier New" panose="02070309020205020404" pitchFamily="49" charset="0"/>
+              </a:rPr>
+              <a:t>(</a:t>
+            </a:r>
+            <a:r>
+              <a:rPr kumimoji="0" lang="en-US" altLang="en-US" sz="2000" b="0" i="0" u="none" strike="noStrike" cap="none" normalizeH="0" baseline="0" dirty="0" err="1" smtClean="0">
+                <a:ln>
+                  <a:noFill/>
+                </a:ln>
+                <a:solidFill>
+                  <a:srgbClr val="A9B7C6"/>
+                </a:solidFill>
+                <a:effectLst/>
+                <a:latin typeface="Courier New" panose="02070309020205020404" pitchFamily="49" charset="0"/>
+                <a:cs typeface="Courier New" panose="02070309020205020404" pitchFamily="49" charset="0"/>
+              </a:rPr>
+              <a:t>str</a:t>
+            </a:r>
+            <a:r>
+              <a:rPr kumimoji="0" lang="en-US" altLang="en-US" sz="2000" b="0" i="0" u="none" strike="noStrike" cap="none" normalizeH="0" baseline="0" dirty="0" smtClean="0">
+                <a:ln>
+                  <a:noFill/>
+                </a:ln>
+                <a:solidFill>
+                  <a:srgbClr val="A9B7C6"/>
+                </a:solidFill>
+                <a:effectLst/>
+                <a:latin typeface="Courier New" panose="02070309020205020404" pitchFamily="49" charset="0"/>
+                <a:cs typeface="Courier New" panose="02070309020205020404" pitchFamily="49" charset="0"/>
+              </a:rPr>
+              <a:t>: String): </a:t>
+            </a:r>
+            <a:r>
+              <a:rPr kumimoji="0" lang="en-US" altLang="en-US" sz="2000" b="0" i="0" u="none" strike="noStrike" cap="none" normalizeH="0" baseline="0" dirty="0" err="1" smtClean="0">
+                <a:ln>
+                  <a:noFill/>
+                </a:ln>
+                <a:solidFill>
+                  <a:srgbClr val="A9B7C6"/>
+                </a:solidFill>
+                <a:effectLst/>
+                <a:latin typeface="Courier New" panose="02070309020205020404" pitchFamily="49" charset="0"/>
+                <a:cs typeface="Courier New" panose="02070309020205020404" pitchFamily="49" charset="0"/>
+              </a:rPr>
+              <a:t>Int</a:t>
+            </a:r>
+            <a:r>
+              <a:rPr kumimoji="0" lang="en-US" altLang="en-US" sz="2000" b="0" i="0" u="none" strike="noStrike" cap="none" normalizeH="0" baseline="0" dirty="0" smtClean="0">
+                <a:ln>
+                  <a:noFill/>
+                </a:ln>
+                <a:solidFill>
+                  <a:srgbClr val="A9B7C6"/>
+                </a:solidFill>
+                <a:effectLst/>
+                <a:latin typeface="Courier New" panose="02070309020205020404" pitchFamily="49" charset="0"/>
+                <a:cs typeface="Courier New" panose="02070309020205020404" pitchFamily="49" charset="0"/>
+              </a:rPr>
+              <a:t>?</a:t>
+            </a:r>
+            <a:br>
+              <a:rPr kumimoji="0" lang="en-US" altLang="en-US" sz="2000" b="0" i="0" u="none" strike="noStrike" cap="none" normalizeH="0" baseline="0" dirty="0" smtClean="0">
+                <a:ln>
+                  <a:noFill/>
+                </a:ln>
+                <a:solidFill>
+                  <a:srgbClr val="A9B7C6"/>
+                </a:solidFill>
+                <a:effectLst/>
+                <a:latin typeface="Courier New" panose="02070309020205020404" pitchFamily="49" charset="0"/>
+                <a:cs typeface="Courier New" panose="02070309020205020404" pitchFamily="49" charset="0"/>
+              </a:rPr>
+            </a:br>
+            <a:r>
+              <a:rPr kumimoji="0" lang="en-US" altLang="en-US" sz="2000" b="0" i="0" u="none" strike="noStrike" cap="none" normalizeH="0" baseline="0" dirty="0" smtClean="0">
+                <a:ln>
+                  <a:noFill/>
+                </a:ln>
+                <a:solidFill>
+                  <a:srgbClr val="A9B7C6"/>
+                </a:solidFill>
+                <a:effectLst/>
+                <a:latin typeface="Courier New" panose="02070309020205020404" pitchFamily="49" charset="0"/>
+                <a:cs typeface="Courier New" panose="02070309020205020404" pitchFamily="49" charset="0"/>
+              </a:rPr>
+              <a:t>{...}</a:t>
+            </a:r>
+            <a:br>
+              <a:rPr kumimoji="0" lang="en-US" altLang="en-US" sz="2000" b="0" i="0" u="none" strike="noStrike" cap="none" normalizeH="0" baseline="0" dirty="0" smtClean="0">
+                <a:ln>
+                  <a:noFill/>
+                </a:ln>
+                <a:solidFill>
+                  <a:srgbClr val="A9B7C6"/>
+                </a:solidFill>
+                <a:effectLst/>
+                <a:latin typeface="Courier New" panose="02070309020205020404" pitchFamily="49" charset="0"/>
+                <a:cs typeface="Courier New" panose="02070309020205020404" pitchFamily="49" charset="0"/>
+              </a:rPr>
+            </a:br>
+            <a:r>
+              <a:rPr kumimoji="0" lang="en-US" altLang="en-US" sz="2000" b="0" i="0" u="none" strike="noStrike" cap="none" normalizeH="0" baseline="0" dirty="0" smtClean="0">
+                <a:ln>
+                  <a:noFill/>
+                </a:ln>
+                <a:solidFill>
+                  <a:srgbClr val="A9B7C6"/>
+                </a:solidFill>
+                <a:effectLst/>
+                <a:latin typeface="Courier New" panose="02070309020205020404" pitchFamily="49" charset="0"/>
+                <a:cs typeface="Courier New" panose="02070309020205020404" pitchFamily="49" charset="0"/>
+              </a:rPr>
+              <a:t/>
+            </a:r>
+            <a:br>
+              <a:rPr kumimoji="0" lang="en-US" altLang="en-US" sz="2000" b="0" i="0" u="none" strike="noStrike" cap="none" normalizeH="0" baseline="0" dirty="0" smtClean="0">
+                <a:ln>
+                  <a:noFill/>
+                </a:ln>
+                <a:solidFill>
+                  <a:srgbClr val="A9B7C6"/>
+                </a:solidFill>
+                <a:effectLst/>
+                <a:latin typeface="Courier New" panose="02070309020205020404" pitchFamily="49" charset="0"/>
+                <a:cs typeface="Courier New" panose="02070309020205020404" pitchFamily="49" charset="0"/>
+              </a:rPr>
+            </a:br>
+            <a:r>
+              <a:rPr kumimoji="0" lang="en-US" altLang="en-US" sz="2000" b="0" i="0" u="none" strike="noStrike" cap="none" normalizeH="0" baseline="0" dirty="0" smtClean="0">
+                <a:ln>
+                  <a:noFill/>
+                </a:ln>
+                <a:solidFill>
+                  <a:srgbClr val="CC7832"/>
+                </a:solidFill>
+                <a:effectLst/>
+                <a:latin typeface="Courier New" panose="02070309020205020404" pitchFamily="49" charset="0"/>
+                <a:cs typeface="Courier New" panose="02070309020205020404" pitchFamily="49" charset="0"/>
+              </a:rPr>
+              <a:t>fun </a:t>
+            </a:r>
+            <a:r>
+              <a:rPr kumimoji="0" lang="en-US" altLang="en-US" sz="2000" b="0" i="0" u="none" strike="noStrike" cap="none" normalizeH="0" baseline="0" dirty="0" smtClean="0">
+                <a:ln>
+                  <a:noFill/>
+                </a:ln>
+                <a:solidFill>
+                  <a:srgbClr val="FFC66D"/>
+                </a:solidFill>
+                <a:effectLst/>
+                <a:latin typeface="Courier New" panose="02070309020205020404" pitchFamily="49" charset="0"/>
+                <a:cs typeface="Courier New" panose="02070309020205020404" pitchFamily="49" charset="0"/>
+              </a:rPr>
+              <a:t>main</a:t>
+            </a:r>
+            <a:r>
+              <a:rPr kumimoji="0" lang="en-US" altLang="en-US" sz="2000" b="0" i="0" u="none" strike="noStrike" cap="none" normalizeH="0" baseline="0" dirty="0" smtClean="0">
+                <a:ln>
+                  <a:noFill/>
+                </a:ln>
+                <a:solidFill>
+                  <a:srgbClr val="A9B7C6"/>
+                </a:solidFill>
+                <a:effectLst/>
+                <a:latin typeface="Courier New" panose="02070309020205020404" pitchFamily="49" charset="0"/>
+                <a:cs typeface="Courier New" panose="02070309020205020404" pitchFamily="49" charset="0"/>
+              </a:rPr>
+              <a:t>(</a:t>
+            </a:r>
+            <a:r>
+              <a:rPr kumimoji="0" lang="en-US" altLang="en-US" sz="2000" b="0" i="0" u="none" strike="noStrike" cap="none" normalizeH="0" baseline="0" dirty="0" err="1" smtClean="0">
+                <a:ln>
+                  <a:noFill/>
+                </a:ln>
+                <a:solidFill>
+                  <a:srgbClr val="A9B7C6"/>
+                </a:solidFill>
+                <a:effectLst/>
+                <a:latin typeface="Courier New" panose="02070309020205020404" pitchFamily="49" charset="0"/>
+                <a:cs typeface="Courier New" panose="02070309020205020404" pitchFamily="49" charset="0"/>
+              </a:rPr>
+              <a:t>args</a:t>
+            </a:r>
+            <a:r>
+              <a:rPr kumimoji="0" lang="en-US" altLang="en-US" sz="2000" b="0" i="0" u="none" strike="noStrike" cap="none" normalizeH="0" baseline="0" dirty="0" smtClean="0">
+                <a:ln>
+                  <a:noFill/>
+                </a:ln>
+                <a:solidFill>
+                  <a:srgbClr val="A9B7C6"/>
+                </a:solidFill>
+                <a:effectLst/>
+                <a:latin typeface="Courier New" panose="02070309020205020404" pitchFamily="49" charset="0"/>
+                <a:cs typeface="Courier New" panose="02070309020205020404" pitchFamily="49" charset="0"/>
+              </a:rPr>
+              <a:t>: Array&lt;String&gt;)</a:t>
+            </a:r>
+            <a:br>
+              <a:rPr kumimoji="0" lang="en-US" altLang="en-US" sz="2000" b="0" i="0" u="none" strike="noStrike" cap="none" normalizeH="0" baseline="0" dirty="0" smtClean="0">
+                <a:ln>
+                  <a:noFill/>
+                </a:ln>
+                <a:solidFill>
+                  <a:srgbClr val="A9B7C6"/>
+                </a:solidFill>
+                <a:effectLst/>
+                <a:latin typeface="Courier New" panose="02070309020205020404" pitchFamily="49" charset="0"/>
+                <a:cs typeface="Courier New" panose="02070309020205020404" pitchFamily="49" charset="0"/>
+              </a:rPr>
+            </a:br>
+            <a:r>
+              <a:rPr kumimoji="0" lang="en-US" altLang="en-US" sz="2000" b="0" i="0" u="none" strike="noStrike" cap="none" normalizeH="0" baseline="0" dirty="0" smtClean="0">
+                <a:ln>
+                  <a:noFill/>
+                </a:ln>
+                <a:solidFill>
+                  <a:srgbClr val="A9B7C6"/>
+                </a:solidFill>
+                <a:effectLst/>
+                <a:latin typeface="Courier New" panose="02070309020205020404" pitchFamily="49" charset="0"/>
+                <a:cs typeface="Courier New" panose="02070309020205020404" pitchFamily="49" charset="0"/>
+              </a:rPr>
+              <a:t>{</a:t>
+            </a:r>
+            <a:br>
+              <a:rPr kumimoji="0" lang="en-US" altLang="en-US" sz="2000" b="0" i="0" u="none" strike="noStrike" cap="none" normalizeH="0" baseline="0" dirty="0" smtClean="0">
+                <a:ln>
+                  <a:noFill/>
+                </a:ln>
+                <a:solidFill>
+                  <a:srgbClr val="A9B7C6"/>
+                </a:solidFill>
+                <a:effectLst/>
+                <a:latin typeface="Courier New" panose="02070309020205020404" pitchFamily="49" charset="0"/>
+                <a:cs typeface="Courier New" panose="02070309020205020404" pitchFamily="49" charset="0"/>
+              </a:rPr>
+            </a:br>
+            <a:r>
+              <a:rPr kumimoji="0" lang="en-US" altLang="en-US" sz="2000" b="0" i="0" u="none" strike="noStrike" cap="none" normalizeH="0" baseline="0" dirty="0" smtClean="0">
+                <a:ln>
+                  <a:noFill/>
+                </a:ln>
+                <a:solidFill>
+                  <a:srgbClr val="A9B7C6"/>
+                </a:solidFill>
+                <a:effectLst/>
+                <a:latin typeface="Courier New" panose="02070309020205020404" pitchFamily="49" charset="0"/>
+                <a:cs typeface="Courier New" panose="02070309020205020404" pitchFamily="49" charset="0"/>
+              </a:rPr>
+              <a:t>    .</a:t>
+            </a:r>
+            <a:r>
+              <a:rPr kumimoji="0" lang="en-US" altLang="en-US" sz="2000" b="0" i="0" u="none" strike="noStrike" cap="none" normalizeH="0" dirty="0" smtClean="0">
+                <a:ln>
+                  <a:noFill/>
+                </a:ln>
+                <a:solidFill>
+                  <a:srgbClr val="A9B7C6"/>
+                </a:solidFill>
+                <a:effectLst/>
+                <a:latin typeface="Courier New" panose="02070309020205020404" pitchFamily="49" charset="0"/>
+                <a:cs typeface="Courier New" panose="02070309020205020404" pitchFamily="49" charset="0"/>
+              </a:rPr>
+              <a:t>..</a:t>
+            </a:r>
+            <a:endParaRPr lang="en-US" altLang="en-US" sz="2000" dirty="0">
+              <a:solidFill>
+                <a:srgbClr val="A9B7C6"/>
+              </a:solidFill>
+              <a:latin typeface="Courier New" panose="02070309020205020404" pitchFamily="49" charset="0"/>
+              <a:cs typeface="Courier New" panose="02070309020205020404" pitchFamily="49" charset="0"/>
+            </a:endParaRPr>
+          </a:p>
+          <a:p>
+            <a:pPr marL="0" marR="0" lvl="0" indent="0" algn="l" defTabSz="914400" rtl="0" eaLnBrk="0" fontAlgn="base" latinLnBrk="0" hangingPunct="0">
+              <a:lnSpc>
+                <a:spcPct val="100000"/>
+              </a:lnSpc>
+              <a:spcBef>
+                <a:spcPct val="0"/>
+              </a:spcBef>
+              <a:spcAft>
+                <a:spcPct val="0"/>
+              </a:spcAft>
+              <a:buClrTx/>
+              <a:buSzTx/>
+              <a:buFontTx/>
+              <a:buNone/>
+              <a:tabLst/>
+            </a:pPr>
+            <a:r>
+              <a:rPr kumimoji="0" lang="en-US" altLang="en-US" sz="2000" b="0" i="0" u="none" strike="noStrike" cap="none" normalizeH="0" baseline="0" dirty="0" smtClean="0">
+                <a:ln>
+                  <a:noFill/>
+                </a:ln>
+                <a:solidFill>
+                  <a:srgbClr val="A9B7C6"/>
+                </a:solidFill>
+                <a:effectLst/>
+                <a:latin typeface="Courier New" panose="02070309020205020404" pitchFamily="49" charset="0"/>
+                <a:cs typeface="Courier New" panose="02070309020205020404" pitchFamily="49" charset="0"/>
+              </a:rPr>
+              <a:t/>
+            </a:r>
+            <a:br>
+              <a:rPr kumimoji="0" lang="en-US" altLang="en-US" sz="2000" b="0" i="0" u="none" strike="noStrike" cap="none" normalizeH="0" baseline="0" dirty="0" smtClean="0">
+                <a:ln>
+                  <a:noFill/>
+                </a:ln>
+                <a:solidFill>
+                  <a:srgbClr val="A9B7C6"/>
+                </a:solidFill>
+                <a:effectLst/>
+                <a:latin typeface="Courier New" panose="02070309020205020404" pitchFamily="49" charset="0"/>
+                <a:cs typeface="Courier New" panose="02070309020205020404" pitchFamily="49" charset="0"/>
+              </a:rPr>
+            </a:br>
+            <a:r>
+              <a:rPr kumimoji="0" lang="en-US" altLang="en-US" sz="2000" b="0" i="0" u="none" strike="noStrike" cap="none" normalizeH="0" baseline="0" dirty="0" smtClean="0">
+                <a:ln>
+                  <a:noFill/>
+                </a:ln>
+                <a:solidFill>
+                  <a:srgbClr val="A9B7C6"/>
+                </a:solidFill>
+                <a:effectLst/>
+                <a:latin typeface="Courier New" panose="02070309020205020404" pitchFamily="49" charset="0"/>
+                <a:cs typeface="Courier New" panose="02070309020205020404" pitchFamily="49" charset="0"/>
+              </a:rPr>
+              <a:t>    </a:t>
+            </a:r>
+            <a:r>
+              <a:rPr kumimoji="0" lang="en-US" altLang="en-US" sz="2000" b="0" i="0" u="none" strike="noStrike" cap="none" normalizeH="0" baseline="0" dirty="0" err="1" smtClean="0">
+                <a:ln>
+                  <a:noFill/>
+                </a:ln>
+                <a:solidFill>
+                  <a:srgbClr val="CC7832"/>
+                </a:solidFill>
+                <a:effectLst/>
+                <a:latin typeface="Courier New" panose="02070309020205020404" pitchFamily="49" charset="0"/>
+                <a:cs typeface="Courier New" panose="02070309020205020404" pitchFamily="49" charset="0"/>
+              </a:rPr>
+              <a:t>val</a:t>
+            </a:r>
+            <a:r>
+              <a:rPr kumimoji="0" lang="en-US" altLang="en-US" sz="2000" b="0" i="0" u="none" strike="noStrike" cap="none" normalizeH="0" baseline="0" dirty="0" smtClean="0">
+                <a:ln>
+                  <a:noFill/>
+                </a:ln>
+                <a:solidFill>
+                  <a:srgbClr val="CC7832"/>
+                </a:solidFill>
+                <a:effectLst/>
+                <a:latin typeface="Courier New" panose="02070309020205020404" pitchFamily="49" charset="0"/>
+                <a:cs typeface="Courier New" panose="02070309020205020404" pitchFamily="49" charset="0"/>
+              </a:rPr>
+              <a:t> </a:t>
+            </a:r>
+            <a:r>
+              <a:rPr kumimoji="0" lang="en-US" altLang="en-US" sz="2000" b="0" i="0" u="none" strike="noStrike" cap="none" normalizeH="0" baseline="0" dirty="0" smtClean="0">
+                <a:ln>
+                  <a:noFill/>
+                </a:ln>
+                <a:solidFill>
+                  <a:srgbClr val="A9B7C6"/>
+                </a:solidFill>
+                <a:effectLst/>
+                <a:latin typeface="Courier New" panose="02070309020205020404" pitchFamily="49" charset="0"/>
+                <a:cs typeface="Courier New" panose="02070309020205020404" pitchFamily="49" charset="0"/>
+              </a:rPr>
+              <a:t>x = </a:t>
+            </a:r>
+            <a:r>
+              <a:rPr kumimoji="0" lang="en-US" altLang="en-US" sz="2000" b="0" i="1" u="none" strike="noStrike" cap="none" normalizeH="0" baseline="0" dirty="0" err="1" smtClean="0">
+                <a:ln>
+                  <a:noFill/>
+                </a:ln>
+                <a:solidFill>
+                  <a:srgbClr val="A9B7C6"/>
+                </a:solidFill>
+                <a:effectLst/>
+                <a:latin typeface="Courier New" panose="02070309020205020404" pitchFamily="49" charset="0"/>
+                <a:cs typeface="Courier New" panose="02070309020205020404" pitchFamily="49" charset="0"/>
+              </a:rPr>
+              <a:t>parseInt</a:t>
+            </a:r>
+            <a:r>
+              <a:rPr kumimoji="0" lang="en-US" altLang="en-US" sz="2000" b="0" i="0" u="none" strike="noStrike" cap="none" normalizeH="0" baseline="0" dirty="0" smtClean="0">
+                <a:ln>
+                  <a:noFill/>
+                </a:ln>
+                <a:solidFill>
+                  <a:srgbClr val="A9B7C6"/>
+                </a:solidFill>
+                <a:effectLst/>
+                <a:latin typeface="Courier New" panose="02070309020205020404" pitchFamily="49" charset="0"/>
+                <a:cs typeface="Courier New" panose="02070309020205020404" pitchFamily="49" charset="0"/>
+              </a:rPr>
+              <a:t>(</a:t>
+            </a:r>
+            <a:r>
+              <a:rPr kumimoji="0" lang="en-US" altLang="en-US" sz="2000" b="0" i="0" u="none" strike="noStrike" cap="none" normalizeH="0" baseline="0" dirty="0" err="1" smtClean="0">
+                <a:ln>
+                  <a:noFill/>
+                </a:ln>
+                <a:solidFill>
+                  <a:srgbClr val="A9B7C6"/>
+                </a:solidFill>
+                <a:effectLst/>
+                <a:latin typeface="Courier New" panose="02070309020205020404" pitchFamily="49" charset="0"/>
+                <a:cs typeface="Courier New" panose="02070309020205020404" pitchFamily="49" charset="0"/>
+              </a:rPr>
+              <a:t>args</a:t>
+            </a:r>
+            <a:r>
+              <a:rPr kumimoji="0" lang="en-US" altLang="en-US" sz="2000" b="0" i="0" u="none" strike="noStrike" cap="none" normalizeH="0" baseline="0" dirty="0" smtClean="0">
+                <a:ln>
+                  <a:noFill/>
+                </a:ln>
+                <a:solidFill>
+                  <a:srgbClr val="A9B7C6"/>
+                </a:solidFill>
+                <a:effectLst/>
+                <a:latin typeface="Courier New" panose="02070309020205020404" pitchFamily="49" charset="0"/>
+                <a:cs typeface="Courier New" panose="02070309020205020404" pitchFamily="49" charset="0"/>
+              </a:rPr>
+              <a:t>[</a:t>
+            </a:r>
+            <a:r>
+              <a:rPr kumimoji="0" lang="en-US" altLang="en-US" sz="2000" b="0" i="0" u="none" strike="noStrike" cap="none" normalizeH="0" baseline="0" dirty="0" smtClean="0">
+                <a:ln>
+                  <a:noFill/>
+                </a:ln>
+                <a:solidFill>
+                  <a:srgbClr val="6897BB"/>
+                </a:solidFill>
+                <a:effectLst/>
+                <a:latin typeface="Courier New" panose="02070309020205020404" pitchFamily="49" charset="0"/>
+                <a:cs typeface="Courier New" panose="02070309020205020404" pitchFamily="49" charset="0"/>
+              </a:rPr>
+              <a:t>0</a:t>
+            </a:r>
+            <a:r>
+              <a:rPr kumimoji="0" lang="en-US" altLang="en-US" sz="2000" b="0" i="0" u="none" strike="noStrike" cap="none" normalizeH="0" baseline="0" dirty="0" smtClean="0">
+                <a:ln>
+                  <a:noFill/>
+                </a:ln>
+                <a:solidFill>
+                  <a:srgbClr val="A9B7C6"/>
+                </a:solidFill>
+                <a:effectLst/>
+                <a:latin typeface="Courier New" panose="02070309020205020404" pitchFamily="49" charset="0"/>
+                <a:cs typeface="Courier New" panose="02070309020205020404" pitchFamily="49" charset="0"/>
+              </a:rPr>
+              <a:t>])</a:t>
+            </a:r>
+            <a:br>
+              <a:rPr kumimoji="0" lang="en-US" altLang="en-US" sz="2000" b="0" i="0" u="none" strike="noStrike" cap="none" normalizeH="0" baseline="0" dirty="0" smtClean="0">
+                <a:ln>
+                  <a:noFill/>
+                </a:ln>
+                <a:solidFill>
+                  <a:srgbClr val="A9B7C6"/>
+                </a:solidFill>
+                <a:effectLst/>
+                <a:latin typeface="Courier New" panose="02070309020205020404" pitchFamily="49" charset="0"/>
+                <a:cs typeface="Courier New" panose="02070309020205020404" pitchFamily="49" charset="0"/>
+              </a:rPr>
+            </a:br>
+            <a:r>
+              <a:rPr kumimoji="0" lang="en-US" altLang="en-US" sz="2000" b="0" i="0" u="none" strike="noStrike" cap="none" normalizeH="0" baseline="0" dirty="0" smtClean="0">
+                <a:ln>
+                  <a:noFill/>
+                </a:ln>
+                <a:solidFill>
+                  <a:srgbClr val="A9B7C6"/>
+                </a:solidFill>
+                <a:effectLst/>
+                <a:latin typeface="Courier New" panose="02070309020205020404" pitchFamily="49" charset="0"/>
+                <a:cs typeface="Courier New" panose="02070309020205020404" pitchFamily="49" charset="0"/>
+              </a:rPr>
+              <a:t>    </a:t>
+            </a:r>
+            <a:r>
+              <a:rPr kumimoji="0" lang="en-US" altLang="en-US" sz="2000" b="0" i="0" u="none" strike="noStrike" cap="none" normalizeH="0" baseline="0" dirty="0" err="1" smtClean="0">
+                <a:ln>
+                  <a:noFill/>
+                </a:ln>
+                <a:solidFill>
+                  <a:srgbClr val="CC7832"/>
+                </a:solidFill>
+                <a:effectLst/>
+                <a:latin typeface="Courier New" panose="02070309020205020404" pitchFamily="49" charset="0"/>
+                <a:cs typeface="Courier New" panose="02070309020205020404" pitchFamily="49" charset="0"/>
+              </a:rPr>
+              <a:t>val</a:t>
+            </a:r>
+            <a:r>
+              <a:rPr kumimoji="0" lang="en-US" altLang="en-US" sz="2000" b="0" i="0" u="none" strike="noStrike" cap="none" normalizeH="0" baseline="0" dirty="0" smtClean="0">
+                <a:ln>
+                  <a:noFill/>
+                </a:ln>
+                <a:solidFill>
+                  <a:srgbClr val="CC7832"/>
+                </a:solidFill>
+                <a:effectLst/>
+                <a:latin typeface="Courier New" panose="02070309020205020404" pitchFamily="49" charset="0"/>
+                <a:cs typeface="Courier New" panose="02070309020205020404" pitchFamily="49" charset="0"/>
+              </a:rPr>
+              <a:t> </a:t>
+            </a:r>
+            <a:r>
+              <a:rPr kumimoji="0" lang="en-US" altLang="en-US" sz="2000" b="0" i="0" u="none" strike="noStrike" cap="none" normalizeH="0" baseline="0" dirty="0" smtClean="0">
+                <a:ln>
+                  <a:noFill/>
+                </a:ln>
+                <a:solidFill>
+                  <a:srgbClr val="A9B7C6"/>
+                </a:solidFill>
+                <a:effectLst/>
+                <a:latin typeface="Courier New" panose="02070309020205020404" pitchFamily="49" charset="0"/>
+                <a:cs typeface="Courier New" panose="02070309020205020404" pitchFamily="49" charset="0"/>
+              </a:rPr>
+              <a:t>y = </a:t>
+            </a:r>
+            <a:r>
+              <a:rPr kumimoji="0" lang="en-US" altLang="en-US" sz="2000" b="0" i="1" u="none" strike="noStrike" cap="none" normalizeH="0" baseline="0" dirty="0" err="1" smtClean="0">
+                <a:ln>
+                  <a:noFill/>
+                </a:ln>
+                <a:solidFill>
+                  <a:srgbClr val="A9B7C6"/>
+                </a:solidFill>
+                <a:effectLst/>
+                <a:latin typeface="Courier New" panose="02070309020205020404" pitchFamily="49" charset="0"/>
+                <a:cs typeface="Courier New" panose="02070309020205020404" pitchFamily="49" charset="0"/>
+              </a:rPr>
+              <a:t>parseInt</a:t>
+            </a:r>
+            <a:r>
+              <a:rPr kumimoji="0" lang="en-US" altLang="en-US" sz="2000" b="0" i="0" u="none" strike="noStrike" cap="none" normalizeH="0" baseline="0" dirty="0" smtClean="0">
+                <a:ln>
+                  <a:noFill/>
+                </a:ln>
+                <a:solidFill>
+                  <a:srgbClr val="A9B7C6"/>
+                </a:solidFill>
+                <a:effectLst/>
+                <a:latin typeface="Courier New" panose="02070309020205020404" pitchFamily="49" charset="0"/>
+                <a:cs typeface="Courier New" panose="02070309020205020404" pitchFamily="49" charset="0"/>
+              </a:rPr>
+              <a:t>(</a:t>
+            </a:r>
+            <a:r>
+              <a:rPr kumimoji="0" lang="en-US" altLang="en-US" sz="2000" b="0" i="0" u="none" strike="noStrike" cap="none" normalizeH="0" baseline="0" dirty="0" err="1" smtClean="0">
+                <a:ln>
+                  <a:noFill/>
+                </a:ln>
+                <a:solidFill>
+                  <a:srgbClr val="A9B7C6"/>
+                </a:solidFill>
+                <a:effectLst/>
+                <a:latin typeface="Courier New" panose="02070309020205020404" pitchFamily="49" charset="0"/>
+                <a:cs typeface="Courier New" panose="02070309020205020404" pitchFamily="49" charset="0"/>
+              </a:rPr>
+              <a:t>args</a:t>
+            </a:r>
+            <a:r>
+              <a:rPr kumimoji="0" lang="en-US" altLang="en-US" sz="2000" b="0" i="0" u="none" strike="noStrike" cap="none" normalizeH="0" baseline="0" dirty="0" smtClean="0">
+                <a:ln>
+                  <a:noFill/>
+                </a:ln>
+                <a:solidFill>
+                  <a:srgbClr val="A9B7C6"/>
+                </a:solidFill>
+                <a:effectLst/>
+                <a:latin typeface="Courier New" panose="02070309020205020404" pitchFamily="49" charset="0"/>
+                <a:cs typeface="Courier New" panose="02070309020205020404" pitchFamily="49" charset="0"/>
+              </a:rPr>
+              <a:t>[</a:t>
+            </a:r>
+            <a:r>
+              <a:rPr kumimoji="0" lang="en-US" altLang="en-US" sz="2000" b="0" i="0" u="none" strike="noStrike" cap="none" normalizeH="0" baseline="0" dirty="0" smtClean="0">
+                <a:ln>
+                  <a:noFill/>
+                </a:ln>
+                <a:solidFill>
+                  <a:srgbClr val="6897BB"/>
+                </a:solidFill>
+                <a:effectLst/>
+                <a:latin typeface="Courier New" panose="02070309020205020404" pitchFamily="49" charset="0"/>
+                <a:cs typeface="Courier New" panose="02070309020205020404" pitchFamily="49" charset="0"/>
+              </a:rPr>
+              <a:t>1</a:t>
+            </a:r>
+            <a:r>
+              <a:rPr kumimoji="0" lang="en-US" altLang="en-US" sz="2000" b="0" i="0" u="none" strike="noStrike" cap="none" normalizeH="0" baseline="0" dirty="0" smtClean="0">
+                <a:ln>
+                  <a:noFill/>
+                </a:ln>
+                <a:solidFill>
+                  <a:srgbClr val="A9B7C6"/>
+                </a:solidFill>
+                <a:effectLst/>
+                <a:latin typeface="Courier New" panose="02070309020205020404" pitchFamily="49" charset="0"/>
+                <a:cs typeface="Courier New" panose="02070309020205020404" pitchFamily="49" charset="0"/>
+              </a:rPr>
+              <a:t>])</a:t>
+            </a:r>
+            <a:br>
+              <a:rPr kumimoji="0" lang="en-US" altLang="en-US" sz="2000" b="0" i="0" u="none" strike="noStrike" cap="none" normalizeH="0" baseline="0" dirty="0" smtClean="0">
+                <a:ln>
+                  <a:noFill/>
+                </a:ln>
+                <a:solidFill>
+                  <a:srgbClr val="A9B7C6"/>
+                </a:solidFill>
+                <a:effectLst/>
+                <a:latin typeface="Courier New" panose="02070309020205020404" pitchFamily="49" charset="0"/>
+                <a:cs typeface="Courier New" panose="02070309020205020404" pitchFamily="49" charset="0"/>
+              </a:rPr>
+            </a:br>
+            <a:r>
+              <a:rPr kumimoji="0" lang="en-US" altLang="en-US" sz="2000" b="0" i="0" u="none" strike="noStrike" cap="none" normalizeH="0" baseline="0" dirty="0" smtClean="0">
+                <a:ln>
+                  <a:noFill/>
+                </a:ln>
+                <a:solidFill>
+                  <a:srgbClr val="808080"/>
+                </a:solidFill>
+                <a:effectLst/>
+                <a:latin typeface="Courier New" panose="02070309020205020404" pitchFamily="49" charset="0"/>
+                <a:cs typeface="Courier New" panose="02070309020205020404" pitchFamily="49" charset="0"/>
+              </a:rPr>
+              <a:t/>
+            </a:r>
+            <a:br>
+              <a:rPr kumimoji="0" lang="en-US" altLang="en-US" sz="2000" b="0" i="0" u="none" strike="noStrike" cap="none" normalizeH="0" baseline="0" dirty="0" smtClean="0">
+                <a:ln>
+                  <a:noFill/>
+                </a:ln>
+                <a:solidFill>
+                  <a:srgbClr val="808080"/>
+                </a:solidFill>
+                <a:effectLst/>
+                <a:latin typeface="Courier New" panose="02070309020205020404" pitchFamily="49" charset="0"/>
+                <a:cs typeface="Courier New" panose="02070309020205020404" pitchFamily="49" charset="0"/>
+              </a:rPr>
+            </a:br>
+            <a:r>
+              <a:rPr kumimoji="0" lang="en-US" altLang="en-US" sz="2000" b="0" i="0" u="none" strike="noStrike" cap="none" normalizeH="0" baseline="0" dirty="0" smtClean="0">
+                <a:ln>
+                  <a:noFill/>
+                </a:ln>
+                <a:solidFill>
+                  <a:srgbClr val="808080"/>
+                </a:solidFill>
+                <a:effectLst/>
+                <a:latin typeface="Courier New" panose="02070309020205020404" pitchFamily="49" charset="0"/>
+                <a:cs typeface="Courier New" panose="02070309020205020404" pitchFamily="49" charset="0"/>
+              </a:rPr>
+              <a:t>    </a:t>
+            </a:r>
+            <a:r>
+              <a:rPr kumimoji="0" lang="en-US" altLang="en-US" sz="2000" b="0" i="0" u="none" strike="noStrike" cap="none" normalizeH="0" baseline="0" dirty="0" smtClean="0">
+                <a:ln>
+                  <a:noFill/>
+                </a:ln>
+                <a:solidFill>
+                  <a:srgbClr val="CC7832"/>
+                </a:solidFill>
+                <a:effectLst/>
+                <a:latin typeface="Courier New" panose="02070309020205020404" pitchFamily="49" charset="0"/>
+                <a:cs typeface="Courier New" panose="02070309020205020404" pitchFamily="49" charset="0"/>
+              </a:rPr>
+              <a:t>if </a:t>
+            </a:r>
+            <a:r>
+              <a:rPr kumimoji="0" lang="en-US" altLang="en-US" sz="2000" b="0" i="0" u="none" strike="noStrike" cap="none" normalizeH="0" baseline="0" dirty="0" smtClean="0">
+                <a:ln>
+                  <a:noFill/>
+                </a:ln>
+                <a:solidFill>
+                  <a:srgbClr val="A9B7C6"/>
+                </a:solidFill>
+                <a:effectLst/>
+                <a:latin typeface="Courier New" panose="02070309020205020404" pitchFamily="49" charset="0"/>
+                <a:cs typeface="Courier New" panose="02070309020205020404" pitchFamily="49" charset="0"/>
+              </a:rPr>
+              <a:t>(x != </a:t>
+            </a:r>
+            <a:r>
+              <a:rPr kumimoji="0" lang="en-US" altLang="en-US" sz="2000" b="0" i="0" u="none" strike="noStrike" cap="none" normalizeH="0" baseline="0" dirty="0" smtClean="0">
+                <a:ln>
+                  <a:noFill/>
+                </a:ln>
+                <a:solidFill>
+                  <a:srgbClr val="CC7832"/>
+                </a:solidFill>
+                <a:effectLst/>
+                <a:latin typeface="Courier New" panose="02070309020205020404" pitchFamily="49" charset="0"/>
+                <a:cs typeface="Courier New" panose="02070309020205020404" pitchFamily="49" charset="0"/>
+              </a:rPr>
+              <a:t>null </a:t>
+            </a:r>
+            <a:r>
+              <a:rPr kumimoji="0" lang="en-US" altLang="en-US" sz="2000" b="0" i="0" u="none" strike="noStrike" cap="none" normalizeH="0" baseline="0" dirty="0" smtClean="0">
+                <a:ln>
+                  <a:noFill/>
+                </a:ln>
+                <a:solidFill>
+                  <a:srgbClr val="A9B7C6"/>
+                </a:solidFill>
+                <a:effectLst/>
+                <a:latin typeface="Courier New" panose="02070309020205020404" pitchFamily="49" charset="0"/>
+                <a:cs typeface="Courier New" panose="02070309020205020404" pitchFamily="49" charset="0"/>
+              </a:rPr>
+              <a:t>&amp;&amp; y != </a:t>
+            </a:r>
+            <a:r>
+              <a:rPr kumimoji="0" lang="en-US" altLang="en-US" sz="2000" b="0" i="0" u="none" strike="noStrike" cap="none" normalizeH="0" baseline="0" dirty="0" smtClean="0">
+                <a:ln>
+                  <a:noFill/>
+                </a:ln>
+                <a:solidFill>
+                  <a:srgbClr val="CC7832"/>
+                </a:solidFill>
+                <a:effectLst/>
+                <a:latin typeface="Courier New" panose="02070309020205020404" pitchFamily="49" charset="0"/>
+                <a:cs typeface="Courier New" panose="02070309020205020404" pitchFamily="49" charset="0"/>
+              </a:rPr>
+              <a:t>null</a:t>
+            </a:r>
+            <a:r>
+              <a:rPr kumimoji="0" lang="en-US" altLang="en-US" sz="2000" b="0" i="0" u="none" strike="noStrike" cap="none" normalizeH="0" baseline="0" dirty="0" smtClean="0">
+                <a:ln>
+                  <a:noFill/>
+                </a:ln>
+                <a:solidFill>
+                  <a:srgbClr val="A9B7C6"/>
+                </a:solidFill>
+                <a:effectLst/>
+                <a:latin typeface="Courier New" panose="02070309020205020404" pitchFamily="49" charset="0"/>
+                <a:cs typeface="Courier New" panose="02070309020205020404" pitchFamily="49" charset="0"/>
+              </a:rPr>
+              <a:t>)</a:t>
+            </a:r>
+            <a:br>
+              <a:rPr kumimoji="0" lang="en-US" altLang="en-US" sz="2000" b="0" i="0" u="none" strike="noStrike" cap="none" normalizeH="0" baseline="0" dirty="0" smtClean="0">
+                <a:ln>
+                  <a:noFill/>
+                </a:ln>
+                <a:solidFill>
+                  <a:srgbClr val="A9B7C6"/>
+                </a:solidFill>
+                <a:effectLst/>
+                <a:latin typeface="Courier New" panose="02070309020205020404" pitchFamily="49" charset="0"/>
+                <a:cs typeface="Courier New" panose="02070309020205020404" pitchFamily="49" charset="0"/>
+              </a:rPr>
+            </a:br>
+            <a:r>
+              <a:rPr kumimoji="0" lang="en-US" altLang="en-US" sz="2000" b="0" i="0" u="none" strike="noStrike" cap="none" normalizeH="0" baseline="0" dirty="0" smtClean="0">
+                <a:ln>
+                  <a:noFill/>
+                </a:ln>
+                <a:solidFill>
+                  <a:srgbClr val="A9B7C6"/>
+                </a:solidFill>
+                <a:effectLst/>
+                <a:latin typeface="Courier New" panose="02070309020205020404" pitchFamily="49" charset="0"/>
+                <a:cs typeface="Courier New" panose="02070309020205020404" pitchFamily="49" charset="0"/>
+              </a:rPr>
+              <a:t>    {</a:t>
+            </a:r>
+            <a:r>
+              <a:rPr kumimoji="0" lang="en-US" altLang="en-US" sz="2000" b="0" i="0" u="none" strike="noStrike" cap="none" normalizeH="0" baseline="0" dirty="0" smtClean="0">
+                <a:ln>
+                  <a:noFill/>
+                </a:ln>
+                <a:solidFill>
+                  <a:srgbClr val="808080"/>
+                </a:solidFill>
+                <a:effectLst/>
+                <a:latin typeface="Courier New" panose="02070309020205020404" pitchFamily="49" charset="0"/>
+                <a:cs typeface="Courier New" panose="02070309020205020404" pitchFamily="49" charset="0"/>
+              </a:rPr>
+              <a:t/>
+            </a:r>
+            <a:br>
+              <a:rPr kumimoji="0" lang="en-US" altLang="en-US" sz="2000" b="0" i="0" u="none" strike="noStrike" cap="none" normalizeH="0" baseline="0" dirty="0" smtClean="0">
+                <a:ln>
+                  <a:noFill/>
+                </a:ln>
+                <a:solidFill>
+                  <a:srgbClr val="808080"/>
+                </a:solidFill>
+                <a:effectLst/>
+                <a:latin typeface="Courier New" panose="02070309020205020404" pitchFamily="49" charset="0"/>
+                <a:cs typeface="Courier New" panose="02070309020205020404" pitchFamily="49" charset="0"/>
+              </a:rPr>
+            </a:br>
+            <a:r>
+              <a:rPr kumimoji="0" lang="en-US" altLang="en-US" sz="2000" b="0" i="0" u="none" strike="noStrike" cap="none" normalizeH="0" baseline="0" dirty="0" smtClean="0">
+                <a:ln>
+                  <a:noFill/>
+                </a:ln>
+                <a:solidFill>
+                  <a:srgbClr val="808080"/>
+                </a:solidFill>
+                <a:effectLst/>
+                <a:latin typeface="Courier New" panose="02070309020205020404" pitchFamily="49" charset="0"/>
+                <a:cs typeface="Courier New" panose="02070309020205020404" pitchFamily="49" charset="0"/>
+              </a:rPr>
+              <a:t>        </a:t>
+            </a:r>
+            <a:r>
+              <a:rPr kumimoji="0" lang="en-US" altLang="en-US" sz="2000" b="0" i="1" u="none" strike="noStrike" cap="none" normalizeH="0" baseline="0" dirty="0" smtClean="0">
+                <a:ln>
+                  <a:noFill/>
+                </a:ln>
+                <a:solidFill>
+                  <a:srgbClr val="A9B7C6"/>
+                </a:solidFill>
+                <a:effectLst/>
+                <a:latin typeface="Courier New" panose="02070309020205020404" pitchFamily="49" charset="0"/>
+                <a:cs typeface="Courier New" panose="02070309020205020404" pitchFamily="49" charset="0"/>
+              </a:rPr>
+              <a:t>print</a:t>
+            </a:r>
+            <a:r>
+              <a:rPr kumimoji="0" lang="en-US" altLang="en-US" sz="2000" b="0" i="0" u="none" strike="noStrike" cap="none" normalizeH="0" baseline="0" dirty="0" smtClean="0">
+                <a:ln>
+                  <a:noFill/>
+                </a:ln>
+                <a:solidFill>
+                  <a:srgbClr val="A9B7C6"/>
+                </a:solidFill>
+                <a:effectLst/>
+                <a:latin typeface="Courier New" panose="02070309020205020404" pitchFamily="49" charset="0"/>
+                <a:cs typeface="Courier New" panose="02070309020205020404" pitchFamily="49" charset="0"/>
+              </a:rPr>
+              <a:t>(x * y)</a:t>
+            </a:r>
+            <a:br>
+              <a:rPr kumimoji="0" lang="en-US" altLang="en-US" sz="2000" b="0" i="0" u="none" strike="noStrike" cap="none" normalizeH="0" baseline="0" dirty="0" smtClean="0">
+                <a:ln>
+                  <a:noFill/>
+                </a:ln>
+                <a:solidFill>
+                  <a:srgbClr val="A9B7C6"/>
+                </a:solidFill>
+                <a:effectLst/>
+                <a:latin typeface="Courier New" panose="02070309020205020404" pitchFamily="49" charset="0"/>
+                <a:cs typeface="Courier New" panose="02070309020205020404" pitchFamily="49" charset="0"/>
+              </a:rPr>
+            </a:br>
+            <a:r>
+              <a:rPr kumimoji="0" lang="en-US" altLang="en-US" sz="2000" b="0" i="0" u="none" strike="noStrike" cap="none" normalizeH="0" baseline="0" dirty="0" smtClean="0">
+                <a:ln>
+                  <a:noFill/>
+                </a:ln>
+                <a:solidFill>
+                  <a:srgbClr val="A9B7C6"/>
+                </a:solidFill>
+                <a:effectLst/>
+                <a:latin typeface="Courier New" panose="02070309020205020404" pitchFamily="49" charset="0"/>
+                <a:cs typeface="Courier New" panose="02070309020205020404" pitchFamily="49" charset="0"/>
+              </a:rPr>
+              <a:t>    }</a:t>
+            </a:r>
+            <a:br>
+              <a:rPr kumimoji="0" lang="en-US" altLang="en-US" sz="2000" b="0" i="0" u="none" strike="noStrike" cap="none" normalizeH="0" baseline="0" dirty="0" smtClean="0">
+                <a:ln>
+                  <a:noFill/>
+                </a:ln>
+                <a:solidFill>
+                  <a:srgbClr val="A9B7C6"/>
+                </a:solidFill>
+                <a:effectLst/>
+                <a:latin typeface="Courier New" panose="02070309020205020404" pitchFamily="49" charset="0"/>
+                <a:cs typeface="Courier New" panose="02070309020205020404" pitchFamily="49" charset="0"/>
+              </a:rPr>
+            </a:br>
+            <a:r>
+              <a:rPr kumimoji="0" lang="en-US" altLang="en-US" sz="2000" b="0" i="0" u="none" strike="noStrike" cap="none" normalizeH="0" baseline="0" dirty="0" smtClean="0">
+                <a:ln>
+                  <a:noFill/>
+                </a:ln>
+                <a:solidFill>
+                  <a:srgbClr val="A9B7C6"/>
+                </a:solidFill>
+                <a:effectLst/>
+                <a:latin typeface="Courier New" panose="02070309020205020404" pitchFamily="49" charset="0"/>
+                <a:cs typeface="Courier New" panose="02070309020205020404" pitchFamily="49" charset="0"/>
+              </a:rPr>
+              <a:t>}</a:t>
+            </a:r>
+            <a:endParaRPr kumimoji="0" lang="en-US" altLang="en-US" sz="4800" b="0" i="0" u="none" strike="noStrike" cap="none" normalizeH="0" baseline="0" dirty="0" smtClean="0">
+              <a:ln>
+                <a:noFill/>
+              </a:ln>
+              <a:solidFill>
+                <a:schemeClr val="tx1"/>
+              </a:solidFill>
+              <a:effectLst/>
+              <a:latin typeface="Arial" panose="020B0604020202020204" pitchFamily="34" charset="0"/>
+            </a:endParaRPr>
+          </a:p>
+        </p:txBody>
+      </p:sp>
+      <p:sp>
+        <p:nvSpPr>
+          <p:cNvPr id="2" name="Title 1"/>
+          <p:cNvSpPr>
+            <a:spLocks noGrp="1"/>
+          </p:cNvSpPr>
+          <p:nvPr>
+            <p:ph type="title"/>
+          </p:nvPr>
+        </p:nvSpPr>
+        <p:spPr/>
+        <p:txBody>
+          <a:bodyPr/>
+          <a:lstStyle/>
+          <a:p>
+            <a:r>
+              <a:rPr lang="en-US" dirty="0" smtClean="0"/>
+              <a:t>safety</a:t>
+            </a:r>
+            <a:endParaRPr lang="en-US" dirty="0"/>
+          </a:p>
+        </p:txBody>
+      </p:sp>
+      <p:sp>
+        <p:nvSpPr>
+          <p:cNvPr id="4" name="Slide Number Placeholder 3"/>
+          <p:cNvSpPr>
+            <a:spLocks noGrp="1"/>
+          </p:cNvSpPr>
+          <p:nvPr>
+            <p:ph type="sldNum" sz="quarter" idx="12"/>
+          </p:nvPr>
+        </p:nvSpPr>
+        <p:spPr/>
+        <p:txBody>
+          <a:bodyPr/>
+          <a:lstStyle/>
+          <a:p>
+            <a:fld id="{1DD2B937-2451-42FD-890C-5AA83BEDFA1C}" type="slidenum">
+              <a:rPr lang="en-US" smtClean="0"/>
+              <a:t>6</a:t>
+            </a:fld>
+            <a:endParaRPr lang="en-US"/>
+          </a:p>
+        </p:txBody>
+      </p:sp>
+      <p:grpSp>
+        <p:nvGrpSpPr>
+          <p:cNvPr id="35" name="Group 34"/>
+          <p:cNvGrpSpPr/>
+          <p:nvPr/>
+        </p:nvGrpSpPr>
+        <p:grpSpPr>
+          <a:xfrm>
+            <a:off x="3276600" y="4860745"/>
+            <a:ext cx="5144589" cy="1200329"/>
+            <a:chOff x="3276600" y="4860745"/>
+            <a:chExt cx="5144589" cy="1200329"/>
+          </a:xfrm>
+        </p:grpSpPr>
+        <p:sp>
+          <p:nvSpPr>
+            <p:cNvPr id="7" name="TextBox 6"/>
+            <p:cNvSpPr txBox="1"/>
+            <p:nvPr/>
+          </p:nvSpPr>
+          <p:spPr>
+            <a:xfrm>
+              <a:off x="5410200" y="4860745"/>
+              <a:ext cx="3010989" cy="1200329"/>
+            </a:xfrm>
+            <a:prstGeom prst="rect">
+              <a:avLst/>
+            </a:prstGeom>
+            <a:noFill/>
+          </p:spPr>
+          <p:txBody>
+            <a:bodyPr wrap="square" rtlCol="0">
+              <a:spAutoFit/>
+            </a:bodyPr>
+            <a:lstStyle/>
+            <a:p>
+              <a:pPr algn="ctr"/>
+              <a:r>
+                <a:rPr lang="en-US" sz="2400" dirty="0" smtClean="0"/>
+                <a:t>x and y are cast to a</a:t>
+              </a:r>
+              <a:br>
+                <a:rPr lang="en-US" sz="2400" dirty="0" smtClean="0"/>
+              </a:br>
+              <a:r>
+                <a:rPr lang="en-US" sz="2400" dirty="0" smtClean="0"/>
+                <a:t>non-</a:t>
+              </a:r>
+              <a:r>
+                <a:rPr lang="en-US" sz="2400" dirty="0" err="1" smtClean="0"/>
+                <a:t>nullable</a:t>
+              </a:r>
+              <a:r>
+                <a:rPr lang="en-US" sz="2400" dirty="0" smtClean="0"/>
+                <a:t> type here</a:t>
+              </a:r>
+            </a:p>
+            <a:p>
+              <a:pPr algn="ctr"/>
+              <a:r>
+                <a:rPr lang="en-US" sz="2400" dirty="0" smtClean="0"/>
+                <a:t>(type is </a:t>
+              </a:r>
+              <a:r>
+                <a:rPr lang="en-US" sz="2400" dirty="0" err="1" smtClean="0"/>
+                <a:t>Int</a:t>
+              </a:r>
+              <a:r>
+                <a:rPr lang="en-US" sz="2400" dirty="0" smtClean="0"/>
+                <a:t>)</a:t>
+              </a:r>
+              <a:endParaRPr lang="en-US" sz="2400" dirty="0"/>
+            </a:p>
+          </p:txBody>
+        </p:sp>
+        <p:cxnSp>
+          <p:nvCxnSpPr>
+            <p:cNvPr id="8" name="Straight Connector 7"/>
+            <p:cNvCxnSpPr>
+              <a:endCxn id="7" idx="1"/>
+            </p:cNvCxnSpPr>
+            <p:nvPr/>
+          </p:nvCxnSpPr>
+          <p:spPr>
+            <a:xfrm>
+              <a:off x="3276600" y="5181600"/>
+              <a:ext cx="2133600" cy="279310"/>
+            </a:xfrm>
+            <a:prstGeom prst="line">
+              <a:avLst/>
+            </a:prstGeom>
+            <a:ln w="63500">
+              <a:solidFill>
+                <a:srgbClr val="FFFF00"/>
+              </a:solidFill>
+            </a:ln>
+          </p:spPr>
+          <p:style>
+            <a:lnRef idx="1">
+              <a:schemeClr val="accent1"/>
+            </a:lnRef>
+            <a:fillRef idx="0">
+              <a:schemeClr val="accent1"/>
+            </a:fillRef>
+            <a:effectRef idx="0">
+              <a:schemeClr val="accent1"/>
+            </a:effectRef>
+            <a:fontRef idx="minor">
+              <a:schemeClr val="tx1"/>
+            </a:fontRef>
+          </p:style>
+        </p:cxnSp>
+      </p:grpSp>
+      <p:grpSp>
+        <p:nvGrpSpPr>
+          <p:cNvPr id="34" name="Group 33"/>
+          <p:cNvGrpSpPr/>
+          <p:nvPr/>
+        </p:nvGrpSpPr>
+        <p:grpSpPr>
+          <a:xfrm>
+            <a:off x="2286000" y="3651065"/>
+            <a:ext cx="5967549" cy="830997"/>
+            <a:chOff x="2286000" y="3651065"/>
+            <a:chExt cx="5967549" cy="830997"/>
+          </a:xfrm>
+        </p:grpSpPr>
+        <p:sp>
+          <p:nvSpPr>
+            <p:cNvPr id="6" name="Rectangle 5"/>
+            <p:cNvSpPr/>
+            <p:nvPr/>
+          </p:nvSpPr>
+          <p:spPr>
+            <a:xfrm>
+              <a:off x="2286000" y="3706584"/>
+              <a:ext cx="2667000" cy="713015"/>
+            </a:xfrm>
+            <a:prstGeom prst="rect">
+              <a:avLst/>
+            </a:prstGeom>
+            <a:solidFill>
+              <a:srgbClr val="FFFF00">
+                <a:alpha val="15000"/>
+              </a:srgbClr>
+            </a:solidFill>
+            <a:ln w="63500">
+              <a:solidFill>
+                <a:srgbClr val="FFFF00"/>
+              </a:solidFill>
+            </a:ln>
+          </p:spPr>
+          <p:style>
+            <a:lnRef idx="2">
+              <a:schemeClr val="accent1">
+                <a:shade val="50000"/>
+              </a:schemeClr>
+            </a:lnRef>
+            <a:fillRef idx="1">
+              <a:schemeClr val="accent1"/>
+            </a:fillRef>
+            <a:effectRef idx="0">
+              <a:schemeClr val="accent1"/>
+            </a:effectRef>
+            <a:fontRef idx="minor">
+              <a:schemeClr val="lt1"/>
+            </a:fontRef>
+          </p:style>
+          <p:txBody>
+            <a:bodyPr rtlCol="0" anchor="ctr"/>
+            <a:lstStyle/>
+            <a:p>
+              <a:pPr algn="ctr"/>
+              <a:endParaRPr lang="en-US"/>
+            </a:p>
+          </p:txBody>
+        </p:sp>
+        <p:sp>
+          <p:nvSpPr>
+            <p:cNvPr id="20" name="TextBox 19"/>
+            <p:cNvSpPr txBox="1"/>
+            <p:nvPr/>
+          </p:nvSpPr>
+          <p:spPr>
+            <a:xfrm>
+              <a:off x="5547360" y="3651065"/>
+              <a:ext cx="2706189" cy="830997"/>
+            </a:xfrm>
+            <a:prstGeom prst="rect">
+              <a:avLst/>
+            </a:prstGeom>
+            <a:noFill/>
+          </p:spPr>
+          <p:txBody>
+            <a:bodyPr wrap="square" rtlCol="0">
+              <a:spAutoFit/>
+            </a:bodyPr>
+            <a:lstStyle/>
+            <a:p>
+              <a:pPr algn="ctr"/>
+              <a:r>
+                <a:rPr lang="en-US" sz="2400" dirty="0" smtClean="0"/>
+                <a:t>x and y may be null (type is </a:t>
+              </a:r>
+              <a:r>
+                <a:rPr lang="en-US" sz="2400" dirty="0" err="1" smtClean="0"/>
+                <a:t>Int</a:t>
+              </a:r>
+              <a:r>
+                <a:rPr lang="en-US" sz="2400" dirty="0" smtClean="0"/>
+                <a:t>?)</a:t>
+              </a:r>
+              <a:endParaRPr lang="en-US" sz="2400" dirty="0"/>
+            </a:p>
+          </p:txBody>
+        </p:sp>
+        <p:cxnSp>
+          <p:nvCxnSpPr>
+            <p:cNvPr id="22" name="Straight Connector 21"/>
+            <p:cNvCxnSpPr>
+              <a:stCxn id="6" idx="3"/>
+              <a:endCxn id="20" idx="1"/>
+            </p:cNvCxnSpPr>
+            <p:nvPr/>
+          </p:nvCxnSpPr>
+          <p:spPr>
+            <a:xfrm>
+              <a:off x="4953000" y="4063092"/>
+              <a:ext cx="594360" cy="3472"/>
+            </a:xfrm>
+            <a:prstGeom prst="line">
+              <a:avLst/>
+            </a:prstGeom>
+            <a:ln w="63500">
+              <a:solidFill>
+                <a:srgbClr val="FFFF00"/>
+              </a:solidFill>
+            </a:ln>
+          </p:spPr>
+          <p:style>
+            <a:lnRef idx="1">
+              <a:schemeClr val="accent1"/>
+            </a:lnRef>
+            <a:fillRef idx="0">
+              <a:schemeClr val="accent1"/>
+            </a:fillRef>
+            <a:effectRef idx="0">
+              <a:schemeClr val="accent1"/>
+            </a:effectRef>
+            <a:fontRef idx="minor">
+              <a:schemeClr val="tx1"/>
+            </a:fontRef>
+          </p:style>
+        </p:cxnSp>
+      </p:grpSp>
+      <p:grpSp>
+        <p:nvGrpSpPr>
+          <p:cNvPr id="33" name="Group 32"/>
+          <p:cNvGrpSpPr/>
+          <p:nvPr/>
+        </p:nvGrpSpPr>
+        <p:grpSpPr>
+          <a:xfrm>
+            <a:off x="1066801" y="2565153"/>
+            <a:ext cx="7154091" cy="1854446"/>
+            <a:chOff x="1066801" y="2565153"/>
+            <a:chExt cx="7154091" cy="1854446"/>
+          </a:xfrm>
+        </p:grpSpPr>
+        <p:sp>
+          <p:nvSpPr>
+            <p:cNvPr id="27" name="Rectangle 26"/>
+            <p:cNvSpPr/>
+            <p:nvPr/>
+          </p:nvSpPr>
+          <p:spPr>
+            <a:xfrm>
+              <a:off x="1066801" y="3706584"/>
+              <a:ext cx="990599" cy="713015"/>
+            </a:xfrm>
+            <a:prstGeom prst="rect">
+              <a:avLst/>
+            </a:prstGeom>
+            <a:solidFill>
+              <a:srgbClr val="FFFF00">
+                <a:alpha val="15000"/>
+              </a:srgbClr>
+            </a:solidFill>
+            <a:ln w="63500">
+              <a:solidFill>
+                <a:srgbClr val="FFFF00"/>
+              </a:solidFill>
+            </a:ln>
+          </p:spPr>
+          <p:style>
+            <a:lnRef idx="2">
+              <a:schemeClr val="accent1">
+                <a:shade val="50000"/>
+              </a:schemeClr>
+            </a:lnRef>
+            <a:fillRef idx="1">
+              <a:schemeClr val="accent1"/>
+            </a:fillRef>
+            <a:effectRef idx="0">
+              <a:schemeClr val="accent1"/>
+            </a:effectRef>
+            <a:fontRef idx="minor">
+              <a:schemeClr val="lt1"/>
+            </a:fontRef>
+          </p:style>
+          <p:txBody>
+            <a:bodyPr rtlCol="0" anchor="ctr"/>
+            <a:lstStyle/>
+            <a:p>
+              <a:pPr algn="ctr"/>
+              <a:endParaRPr lang="en-US"/>
+            </a:p>
+          </p:txBody>
+        </p:sp>
+        <p:sp>
+          <p:nvSpPr>
+            <p:cNvPr id="30" name="TextBox 29"/>
+            <p:cNvSpPr txBox="1"/>
+            <p:nvPr/>
+          </p:nvSpPr>
+          <p:spPr>
+            <a:xfrm>
+              <a:off x="5621383" y="2565153"/>
+              <a:ext cx="2599509" cy="830997"/>
+            </a:xfrm>
+            <a:prstGeom prst="rect">
+              <a:avLst/>
+            </a:prstGeom>
+            <a:noFill/>
+          </p:spPr>
+          <p:txBody>
+            <a:bodyPr wrap="square" rtlCol="0">
+              <a:spAutoFit/>
+            </a:bodyPr>
+            <a:lstStyle/>
+            <a:p>
+              <a:pPr algn="ctr"/>
+              <a:r>
+                <a:rPr lang="en-US" sz="2400" dirty="0" smtClean="0"/>
+                <a:t>x and y have immutable values</a:t>
+              </a:r>
+              <a:endParaRPr lang="en-US" sz="2400" dirty="0"/>
+            </a:p>
+          </p:txBody>
+        </p:sp>
+        <p:cxnSp>
+          <p:nvCxnSpPr>
+            <p:cNvPr id="32" name="Elbow Connector 31"/>
+            <p:cNvCxnSpPr>
+              <a:stCxn id="27" idx="0"/>
+              <a:endCxn id="30" idx="1"/>
+            </p:cNvCxnSpPr>
+            <p:nvPr/>
+          </p:nvCxnSpPr>
+          <p:spPr>
+            <a:xfrm rot="5400000" flipH="1" flipV="1">
+              <a:off x="3228776" y="1313977"/>
+              <a:ext cx="725932" cy="4059282"/>
+            </a:xfrm>
+            <a:prstGeom prst="bentConnector2">
+              <a:avLst/>
+            </a:prstGeom>
+            <a:ln w="63500">
+              <a:solidFill>
+                <a:srgbClr val="FFFF00"/>
+              </a:solidFill>
+            </a:ln>
+          </p:spPr>
+          <p:style>
+            <a:lnRef idx="1">
+              <a:schemeClr val="accent1"/>
+            </a:lnRef>
+            <a:fillRef idx="0">
+              <a:schemeClr val="accent1"/>
+            </a:fillRef>
+            <a:effectRef idx="0">
+              <a:schemeClr val="accent1"/>
+            </a:effectRef>
+            <a:fontRef idx="minor">
+              <a:schemeClr val="tx1"/>
+            </a:fontRef>
+          </p:style>
+        </p:cxnSp>
+      </p:grpSp>
+    </p:spTree>
+    <p:extLst>
+      <p:ext uri="{BB962C8B-B14F-4D97-AF65-F5344CB8AC3E}">
+        <p14:creationId xmlns:p14="http://schemas.microsoft.com/office/powerpoint/2010/main" val="1363372669"/>
+      </p:ext>
+    </p:extLst>
+  </p:cSld>
+  <p:clrMapOvr>
+    <a:masterClrMapping/>
+  </p:clrMapOvr>
+  <p:timing>
+    <p:tnLst>
+      <p:par>
+        <p:cTn id="1" dur="indefinite" restart="never" nodeType="tmRoot">
+          <p:childTnLst>
+            <p:seq concurrent="1" nextAc="seek">
+              <p:cTn id="2" dur="indefinite" nodeType="mainSeq">
+                <p:childTnLst>
+                  <p:par>
+                    <p:cTn id="3" fill="hold">
+                      <p:stCondLst>
+                        <p:cond delay="indefinite"/>
+                      </p:stCondLst>
+                      <p:childTnLst>
+                        <p:par>
+                          <p:cTn id="4" fill="hold">
+                            <p:stCondLst>
+                              <p:cond delay="0"/>
+                            </p:stCondLst>
+                            <p:childTnLst>
+                              <p:par>
+                                <p:cTn id="5" presetID="1" presetClass="entr" presetSubtype="0" fill="hold" nodeType="clickEffect">
+                                  <p:stCondLst>
+                                    <p:cond delay="0"/>
+                                  </p:stCondLst>
+                                  <p:childTnLst>
+                                    <p:set>
+                                      <p:cBhvr>
+                                        <p:cTn id="6" dur="1" fill="hold">
+                                          <p:stCondLst>
+                                            <p:cond delay="0"/>
+                                          </p:stCondLst>
+                                        </p:cTn>
+                                        <p:tgtEl>
+                                          <p:spTgt spid="33"/>
+                                        </p:tgtEl>
+                                        <p:attrNameLst>
+                                          <p:attrName>style.visibility</p:attrName>
+                                        </p:attrNameLst>
+                                      </p:cBhvr>
+                                      <p:to>
+                                        <p:strVal val="visible"/>
+                                      </p:to>
+                                    </p:set>
+                                  </p:childTnLst>
+                                </p:cTn>
+                              </p:par>
+                            </p:childTnLst>
+                          </p:cTn>
+                        </p:par>
+                      </p:childTnLst>
+                    </p:cTn>
+                  </p:par>
+                  <p:par>
+                    <p:cTn id="7" fill="hold">
+                      <p:stCondLst>
+                        <p:cond delay="indefinite"/>
+                      </p:stCondLst>
+                      <p:childTnLst>
+                        <p:par>
+                          <p:cTn id="8" fill="hold">
+                            <p:stCondLst>
+                              <p:cond delay="0"/>
+                            </p:stCondLst>
+                            <p:childTnLst>
+                              <p:par>
+                                <p:cTn id="9" presetID="1" presetClass="entr" presetSubtype="0" fill="hold" nodeType="clickEffect">
+                                  <p:stCondLst>
+                                    <p:cond delay="0"/>
+                                  </p:stCondLst>
+                                  <p:childTnLst>
+                                    <p:set>
+                                      <p:cBhvr>
+                                        <p:cTn id="10" dur="1" fill="hold">
+                                          <p:stCondLst>
+                                            <p:cond delay="0"/>
+                                          </p:stCondLst>
+                                        </p:cTn>
+                                        <p:tgtEl>
+                                          <p:spTgt spid="34"/>
+                                        </p:tgtEl>
+                                        <p:attrNameLst>
+                                          <p:attrName>style.visibility</p:attrName>
+                                        </p:attrNameLst>
+                                      </p:cBhvr>
+                                      <p:to>
+                                        <p:strVal val="visible"/>
+                                      </p:to>
+                                    </p:set>
+                                  </p:childTnLst>
+                                </p:cTn>
+                              </p:par>
+                              <p:par>
+                                <p:cTn id="11" presetID="1" presetClass="exit" presetSubtype="0" fill="hold" nodeType="withEffect">
+                                  <p:stCondLst>
+                                    <p:cond delay="0"/>
+                                  </p:stCondLst>
+                                  <p:childTnLst>
+                                    <p:set>
+                                      <p:cBhvr>
+                                        <p:cTn id="12" dur="1" fill="hold">
+                                          <p:stCondLst>
+                                            <p:cond delay="0"/>
+                                          </p:stCondLst>
+                                        </p:cTn>
+                                        <p:tgtEl>
+                                          <p:spTgt spid="33"/>
+                                        </p:tgtEl>
+                                        <p:attrNameLst>
+                                          <p:attrName>style.visibility</p:attrName>
+                                        </p:attrNameLst>
+                                      </p:cBhvr>
+                                      <p:to>
+                                        <p:strVal val="hidden"/>
+                                      </p:to>
+                                    </p:set>
+                                  </p:childTnLst>
+                                </p:cTn>
+                              </p:par>
+                            </p:childTnLst>
+                          </p:cTn>
+                        </p:par>
+                      </p:childTnLst>
+                    </p:cTn>
+                  </p:par>
+                  <p:par>
+                    <p:cTn id="13" fill="hold">
+                      <p:stCondLst>
+                        <p:cond delay="indefinite"/>
+                      </p:stCondLst>
+                      <p:childTnLst>
+                        <p:par>
+                          <p:cTn id="14" fill="hold">
+                            <p:stCondLst>
+                              <p:cond delay="0"/>
+                            </p:stCondLst>
+                            <p:childTnLst>
+                              <p:par>
+                                <p:cTn id="15" presetID="1" presetClass="entr" presetSubtype="0" fill="hold" nodeType="clickEffect">
+                                  <p:stCondLst>
+                                    <p:cond delay="0"/>
+                                  </p:stCondLst>
+                                  <p:childTnLst>
+                                    <p:set>
+                                      <p:cBhvr>
+                                        <p:cTn id="16" dur="1" fill="hold">
+                                          <p:stCondLst>
+                                            <p:cond delay="0"/>
+                                          </p:stCondLst>
+                                        </p:cTn>
+                                        <p:tgtEl>
+                                          <p:spTgt spid="35"/>
+                                        </p:tgtEl>
+                                        <p:attrNameLst>
+                                          <p:attrName>style.visibility</p:attrName>
+                                        </p:attrNameLst>
+                                      </p:cBhvr>
+                                      <p:to>
+                                        <p:strVal val="visible"/>
+                                      </p:to>
+                                    </p:set>
+                                  </p:childTnLst>
+                                </p:cTn>
+                              </p:par>
+                            </p:childTnLst>
+                          </p:cTn>
+                        </p:par>
+                      </p:childTnLst>
+                    </p:cTn>
+                  </p:par>
+                </p:childTnLst>
+              </p:cTn>
+              <p:prevCondLst>
+                <p:cond evt="onPrev" delay="0">
+                  <p:tgtEl>
+                    <p:sldTgt/>
+                  </p:tgtEl>
+                </p:cond>
+              </p:prevCondLst>
+              <p:nextCondLst>
+                <p:cond evt="onNext" delay="0">
+                  <p:tgtEl>
+                    <p:sldTgt/>
+                  </p:tgtEl>
+                </p:cond>
+              </p:nextCondLst>
+            </p:seq>
+          </p:childTnLst>
+        </p:cTn>
+      </p:par>
+    </p:tnLst>
+  </p:timing>
+</p:sld>
+</file>
+
 <file path=ppt/slides/slide7.xml><?xml version="1.0" encoding="utf-8"?>
 <p:sld xmlns:a="http://schemas.openxmlformats.org/drawingml/2006/main" xmlns:r="http://schemas.openxmlformats.org/officeDocument/2006/relationships" xmlns:p="http://schemas.openxmlformats.org/presentationml/2006/main">
   <p:cSld>
@@ -6967,7 +9031,7 @@
           <a:p>
             <a:r>
               <a:rPr lang="en-US" dirty="0" smtClean="0"/>
-              <a:t>classes</a:t>
+              <a:t>verbosity</a:t>
             </a:r>
             <a:endParaRPr lang="en-US" dirty="0"/>
           </a:p>
@@ -6996,889 +9060,365 @@
           </a:p>
         </p:txBody>
       </p:sp>
+    </p:spTree>
+    <p:extLst>
+      <p:ext uri="{BB962C8B-B14F-4D97-AF65-F5344CB8AC3E}">
+        <p14:creationId xmlns:p14="http://schemas.microsoft.com/office/powerpoint/2010/main" val="3183242941"/>
+      </p:ext>
+    </p:extLst>
+  </p:cSld>
+  <p:clrMapOvr>
+    <a:masterClrMapping/>
+  </p:clrMapOvr>
+  <p:timing>
+    <p:tnLst>
+      <p:par>
+        <p:cTn id="1" dur="indefinite" restart="never" nodeType="tmRoot"/>
+      </p:par>
+    </p:tnLst>
+  </p:timing>
+</p:sld>
+</file>
+
+<file path=ppt/slides/slide8.xml><?xml version="1.0" encoding="utf-8"?>
+<p:sld xmlns:a="http://schemas.openxmlformats.org/drawingml/2006/main" xmlns:r="http://schemas.openxmlformats.org/officeDocument/2006/relationships" xmlns:p="http://schemas.openxmlformats.org/presentationml/2006/main">
+  <p:cSld>
+    <p:spTree>
+      <p:nvGrpSpPr>
+        <p:cNvPr id="1" name=""/>
+        <p:cNvGrpSpPr/>
+        <p:nvPr/>
+      </p:nvGrpSpPr>
+      <p:grpSpPr>
+        <a:xfrm>
+          <a:off x="0" y="0"/>
+          <a:ext cx="0" cy="0"/>
+          <a:chOff x="0" y="0"/>
+          <a:chExt cx="0" cy="0"/>
+        </a:xfrm>
+      </p:grpSpPr>
       <p:sp>
         <p:nvSpPr>
-          <p:cNvPr id="6" name="Rectangle 2"/>
+          <p:cNvPr id="4" name="Slide Number Placeholder 3"/>
           <p:cNvSpPr>
-            <a:spLocks noChangeArrowheads="1"/>
+            <a:spLocks noGrp="1"/>
           </p:cNvSpPr>
+          <p:nvPr>
+            <p:ph type="sldNum" sz="quarter" idx="12"/>
+          </p:nvPr>
+        </p:nvSpPr>
+        <p:spPr/>
+        <p:txBody>
+          <a:bodyPr/>
+          <a:lstStyle/>
+          <a:p>
+            <a:fld id="{1DD2B937-2451-42FD-890C-5AA83BEDFA1C}" type="slidenum">
+              <a:rPr lang="en-US" smtClean="0"/>
+              <a:t>8</a:t>
+            </a:fld>
+            <a:endParaRPr lang="en-US"/>
+          </a:p>
+        </p:txBody>
+      </p:sp>
+      <p:pic>
+        <p:nvPicPr>
+          <p:cNvPr id="7" name="Content Placeholder 5"/>
+          <p:cNvPicPr>
+            <a:picLocks noChangeAspect="1"/>
+          </p:cNvPicPr>
           <p:nvPr/>
-        </p:nvSpPr>
-        <p:spPr bwMode="auto">
+        </p:nvPicPr>
+        <p:blipFill>
+          <a:blip r:embed="rId3" cstate="print">
+            <a:extLst>
+              <a:ext uri="{28A0092B-C50C-407E-A947-70E740481C1C}">
+                <a14:useLocalDpi xmlns:a14="http://schemas.microsoft.com/office/drawing/2010/main" val="0"/>
+              </a:ext>
+            </a:extLst>
+          </a:blip>
+          <a:stretch>
+            <a:fillRect/>
+          </a:stretch>
+        </p:blipFill>
+        <p:spPr>
           <a:xfrm>
-            <a:off x="152400" y="1449288"/>
-            <a:ext cx="10081534" cy="5940088"/>
+            <a:off x="6248400" y="2514600"/>
+            <a:ext cx="1659691" cy="1648771"/>
           </a:xfrm>
           <a:prstGeom prst="rect">
             <a:avLst/>
           </a:prstGeom>
-          <a:solidFill>
-            <a:srgbClr val="2B2B2B"/>
-          </a:solidFill>
-          <a:ln>
-            <a:noFill/>
-          </a:ln>
-          <a:effectLst/>
-          <a:extLst>
-            <a:ext uri="{91240B29-F687-4F45-9708-019B960494DF}">
-              <a14:hiddenLine xmlns:a14="http://schemas.microsoft.com/office/drawing/2010/main" w="9525">
-                <a:solidFill>
-                  <a:schemeClr val="tx1"/>
-                </a:solidFill>
-                <a:miter lim="800000"/>
-                <a:headEnd/>
-                <a:tailEnd/>
-              </a14:hiddenLine>
-            </a:ext>
-            <a:ext uri="{AF507438-7753-43E0-B8FC-AC1667EBCBE1}">
-              <a14:hiddenEffects xmlns:a14="http://schemas.microsoft.com/office/drawing/2010/main">
-                <a:effectLst>
-                  <a:outerShdw dist="35921" dir="2700000" algn="ctr" rotWithShape="0">
-                    <a:schemeClr val="bg2"/>
-                  </a:outerShdw>
-                </a:effectLst>
-              </a14:hiddenEffects>
-            </a:ext>
-          </a:extLst>
+        </p:spPr>
+      </p:pic>
+      <p:sp>
+        <p:nvSpPr>
+          <p:cNvPr id="8" name="TextBox 7"/>
+          <p:cNvSpPr txBox="1"/>
+          <p:nvPr/>
+        </p:nvSpPr>
+        <p:spPr>
+          <a:xfrm>
+            <a:off x="1143000" y="2587046"/>
+            <a:ext cx="3124200" cy="1323439"/>
+          </a:xfrm>
+          <a:prstGeom prst="rect">
+            <a:avLst/>
+          </a:prstGeom>
+          <a:noFill/>
         </p:spPr>
         <p:txBody>
-          <a:bodyPr vert="horz" wrap="square" lIns="91440" tIns="45720" rIns="91440" bIns="45720" numCol="1" anchor="ctr" anchorCtr="0" compatLnSpc="1">
-            <a:prstTxWarp prst="textNoShape">
-              <a:avLst/>
-            </a:prstTxWarp>
+          <a:bodyPr wrap="square" rtlCol="0">
             <a:spAutoFit/>
           </a:bodyPr>
           <a:lstStyle/>
           <a:p>
-            <a:pPr marL="0" marR="0" lvl="0" indent="0" algn="l" defTabSz="914400" rtl="0" eaLnBrk="0" fontAlgn="base" latinLnBrk="0" hangingPunct="0">
-              <a:lnSpc>
-                <a:spcPct val="100000"/>
-              </a:lnSpc>
-              <a:spcBef>
-                <a:spcPct val="0"/>
-              </a:spcBef>
-              <a:spcAft>
-                <a:spcPct val="0"/>
-              </a:spcAft>
-              <a:buClrTx/>
-              <a:buSzTx/>
-              <a:buFontTx/>
-              <a:buNone/>
-              <a:tabLst/>
-            </a:pPr>
-            <a:r>
-              <a:rPr kumimoji="0" lang="en-US" altLang="en-US" sz="2000" b="0" i="0" u="none" strike="noStrike" cap="none" normalizeH="0" baseline="0" dirty="0" smtClean="0">
-                <a:ln>
-                  <a:noFill/>
-                </a:ln>
-                <a:solidFill>
-                  <a:srgbClr val="CC7832"/>
-                </a:solidFill>
-                <a:effectLst/>
-                <a:latin typeface="Courier New" panose="02070309020205020404" pitchFamily="49" charset="0"/>
-                <a:cs typeface="Courier New" panose="02070309020205020404" pitchFamily="49" charset="0"/>
-              </a:rPr>
-              <a:t>class </a:t>
-            </a:r>
-            <a:r>
-              <a:rPr kumimoji="0" lang="en-US" altLang="en-US" sz="2000" b="0" i="0" u="none" strike="noStrike" cap="none" normalizeH="0" baseline="0" dirty="0" smtClean="0">
-                <a:ln>
-                  <a:noFill/>
-                </a:ln>
-                <a:solidFill>
-                  <a:srgbClr val="A9B7C6"/>
-                </a:solidFill>
-                <a:effectLst/>
-                <a:latin typeface="Courier New" panose="02070309020205020404" pitchFamily="49" charset="0"/>
-                <a:cs typeface="Courier New" panose="02070309020205020404" pitchFamily="49" charset="0"/>
-              </a:rPr>
-              <a:t>Agent(</a:t>
-            </a:r>
-            <a:r>
-              <a:rPr kumimoji="0" lang="en-US" altLang="en-US" sz="2000" b="0" i="0" u="none" strike="noStrike" cap="none" normalizeH="0" baseline="0" dirty="0" err="1" smtClean="0">
-                <a:ln>
-                  <a:noFill/>
-                </a:ln>
-                <a:solidFill>
-                  <a:srgbClr val="CC7832"/>
-                </a:solidFill>
-                <a:effectLst/>
-                <a:latin typeface="Courier New" panose="02070309020205020404" pitchFamily="49" charset="0"/>
-                <a:cs typeface="Courier New" panose="02070309020205020404" pitchFamily="49" charset="0"/>
-              </a:rPr>
-              <a:t>val</a:t>
-            </a:r>
-            <a:r>
-              <a:rPr kumimoji="0" lang="en-US" altLang="en-US" sz="2000" b="0" i="0" u="none" strike="noStrike" cap="none" normalizeH="0" baseline="0" dirty="0" smtClean="0">
-                <a:ln>
-                  <a:noFill/>
-                </a:ln>
-                <a:solidFill>
-                  <a:srgbClr val="CC7832"/>
-                </a:solidFill>
-                <a:effectLst/>
-                <a:latin typeface="Courier New" panose="02070309020205020404" pitchFamily="49" charset="0"/>
-                <a:cs typeface="Courier New" panose="02070309020205020404" pitchFamily="49" charset="0"/>
-              </a:rPr>
-              <a:t> </a:t>
-            </a:r>
-            <a:r>
-              <a:rPr kumimoji="0" lang="en-US" altLang="en-US" sz="2000" b="0" i="0" u="none" strike="noStrike" cap="none" normalizeH="0" baseline="0" dirty="0" err="1" smtClean="0">
-                <a:ln>
-                  <a:noFill/>
-                </a:ln>
-                <a:solidFill>
-                  <a:srgbClr val="9876AA"/>
-                </a:solidFill>
-                <a:effectLst/>
-                <a:latin typeface="Courier New" panose="02070309020205020404" pitchFamily="49" charset="0"/>
-                <a:cs typeface="Courier New" panose="02070309020205020404" pitchFamily="49" charset="0"/>
-              </a:rPr>
-              <a:t>cognitiveProcessor</a:t>
-            </a:r>
-            <a:r>
-              <a:rPr kumimoji="0" lang="en-US" altLang="en-US" sz="2000" b="0" i="0" u="none" strike="noStrike" cap="none" normalizeH="0" baseline="0" dirty="0" smtClean="0">
-                <a:ln>
-                  <a:noFill/>
-                </a:ln>
-                <a:solidFill>
-                  <a:srgbClr val="A9B7C6"/>
-                </a:solidFill>
-                <a:effectLst/>
-                <a:latin typeface="Courier New" panose="02070309020205020404" pitchFamily="49" charset="0"/>
-                <a:cs typeface="Courier New" panose="02070309020205020404" pitchFamily="49" charset="0"/>
-              </a:rPr>
-              <a:t>: </a:t>
-            </a:r>
-            <a:r>
-              <a:rPr kumimoji="0" lang="en-US" altLang="en-US" sz="2000" b="0" i="0" u="none" strike="noStrike" cap="none" normalizeH="0" baseline="0" dirty="0" err="1" smtClean="0">
-                <a:ln>
-                  <a:noFill/>
-                </a:ln>
-                <a:solidFill>
-                  <a:srgbClr val="A9B7C6"/>
-                </a:solidFill>
-                <a:effectLst/>
-                <a:latin typeface="Courier New" panose="02070309020205020404" pitchFamily="49" charset="0"/>
-                <a:cs typeface="Courier New" panose="02070309020205020404" pitchFamily="49" charset="0"/>
-              </a:rPr>
-              <a:t>CognitiveProcessor</a:t>
-            </a:r>
-            <a:r>
-              <a:rPr kumimoji="0" lang="en-US" altLang="en-US" sz="2000" b="0" i="0" u="none" strike="noStrike" cap="none" normalizeH="0" baseline="0" dirty="0" smtClean="0">
-                <a:ln>
-                  <a:noFill/>
-                </a:ln>
-                <a:solidFill>
-                  <a:srgbClr val="A9B7C6"/>
-                </a:solidFill>
-                <a:effectLst/>
-                <a:latin typeface="Courier New" panose="02070309020205020404" pitchFamily="49" charset="0"/>
-                <a:cs typeface="Courier New" panose="02070309020205020404" pitchFamily="49" charset="0"/>
-              </a:rPr>
-              <a:t>)</a:t>
-            </a:r>
-            <a:br>
-              <a:rPr kumimoji="0" lang="en-US" altLang="en-US" sz="2000" b="0" i="0" u="none" strike="noStrike" cap="none" normalizeH="0" baseline="0" dirty="0" smtClean="0">
-                <a:ln>
-                  <a:noFill/>
-                </a:ln>
-                <a:solidFill>
-                  <a:srgbClr val="A9B7C6"/>
-                </a:solidFill>
-                <a:effectLst/>
-                <a:latin typeface="Courier New" panose="02070309020205020404" pitchFamily="49" charset="0"/>
-                <a:cs typeface="Courier New" panose="02070309020205020404" pitchFamily="49" charset="0"/>
-              </a:rPr>
-            </a:br>
-            <a:r>
-              <a:rPr kumimoji="0" lang="en-US" altLang="en-US" sz="2000" b="0" i="0" u="none" strike="noStrike" cap="none" normalizeH="0" baseline="0" dirty="0" smtClean="0">
-                <a:ln>
-                  <a:noFill/>
-                </a:ln>
-                <a:solidFill>
-                  <a:srgbClr val="A9B7C6"/>
-                </a:solidFill>
-                <a:effectLst/>
-                <a:latin typeface="Courier New" panose="02070309020205020404" pitchFamily="49" charset="0"/>
-                <a:cs typeface="Courier New" panose="02070309020205020404" pitchFamily="49" charset="0"/>
-              </a:rPr>
-              <a:t>{</a:t>
-            </a:r>
-            <a:br>
-              <a:rPr kumimoji="0" lang="en-US" altLang="en-US" sz="2000" b="0" i="0" u="none" strike="noStrike" cap="none" normalizeH="0" baseline="0" dirty="0" smtClean="0">
-                <a:ln>
-                  <a:noFill/>
-                </a:ln>
-                <a:solidFill>
-                  <a:srgbClr val="A9B7C6"/>
-                </a:solidFill>
-                <a:effectLst/>
-                <a:latin typeface="Courier New" panose="02070309020205020404" pitchFamily="49" charset="0"/>
-                <a:cs typeface="Courier New" panose="02070309020205020404" pitchFamily="49" charset="0"/>
-              </a:rPr>
-            </a:br>
-            <a:r>
-              <a:rPr kumimoji="0" lang="en-US" altLang="en-US" sz="2000" b="0" i="0" u="none" strike="noStrike" cap="none" normalizeH="0" baseline="0" dirty="0" smtClean="0">
-                <a:ln>
-                  <a:noFill/>
-                </a:ln>
-                <a:solidFill>
-                  <a:srgbClr val="A9B7C6"/>
-                </a:solidFill>
-                <a:effectLst/>
-                <a:latin typeface="Courier New" panose="02070309020205020404" pitchFamily="49" charset="0"/>
-                <a:cs typeface="Courier New" panose="02070309020205020404" pitchFamily="49" charset="0"/>
-              </a:rPr>
-              <a:t>    </a:t>
-            </a:r>
-            <a:r>
-              <a:rPr kumimoji="0" lang="en-US" altLang="en-US" sz="2000" b="0" i="1" u="none" strike="noStrike" cap="none" normalizeH="0" baseline="0" dirty="0" smtClean="0">
-                <a:ln>
-                  <a:noFill/>
-                </a:ln>
-                <a:solidFill>
-                  <a:srgbClr val="629755"/>
-                </a:solidFill>
-                <a:effectLst/>
-                <a:latin typeface="Courier New" panose="02070309020205020404" pitchFamily="49" charset="0"/>
-                <a:cs typeface="Courier New" panose="02070309020205020404" pitchFamily="49" charset="0"/>
-              </a:rPr>
-              <a:t>/**</a:t>
-            </a:r>
-            <a:br>
-              <a:rPr kumimoji="0" lang="en-US" altLang="en-US" sz="2000" b="0" i="1" u="none" strike="noStrike" cap="none" normalizeH="0" baseline="0" dirty="0" smtClean="0">
-                <a:ln>
-                  <a:noFill/>
-                </a:ln>
-                <a:solidFill>
-                  <a:srgbClr val="629755"/>
-                </a:solidFill>
-                <a:effectLst/>
-                <a:latin typeface="Courier New" panose="02070309020205020404" pitchFamily="49" charset="0"/>
-                <a:cs typeface="Courier New" panose="02070309020205020404" pitchFamily="49" charset="0"/>
-              </a:rPr>
-            </a:br>
-            <a:r>
-              <a:rPr kumimoji="0" lang="en-US" altLang="en-US" sz="2000" b="0" i="1" u="none" strike="noStrike" cap="none" normalizeH="0" baseline="0" dirty="0" smtClean="0">
-                <a:ln>
-                  <a:noFill/>
-                </a:ln>
-                <a:solidFill>
-                  <a:srgbClr val="629755"/>
-                </a:solidFill>
-                <a:effectLst/>
-                <a:latin typeface="Courier New" panose="02070309020205020404" pitchFamily="49" charset="0"/>
-                <a:cs typeface="Courier New" panose="02070309020205020404" pitchFamily="49" charset="0"/>
-              </a:rPr>
-              <a:t>     * "static" methods/constants</a:t>
-            </a:r>
-            <a:br>
-              <a:rPr kumimoji="0" lang="en-US" altLang="en-US" sz="2000" b="0" i="1" u="none" strike="noStrike" cap="none" normalizeH="0" baseline="0" dirty="0" smtClean="0">
-                <a:ln>
-                  <a:noFill/>
-                </a:ln>
-                <a:solidFill>
-                  <a:srgbClr val="629755"/>
-                </a:solidFill>
-                <a:effectLst/>
-                <a:latin typeface="Courier New" panose="02070309020205020404" pitchFamily="49" charset="0"/>
-                <a:cs typeface="Courier New" panose="02070309020205020404" pitchFamily="49" charset="0"/>
-              </a:rPr>
-            </a:br>
-            <a:r>
-              <a:rPr kumimoji="0" lang="en-US" altLang="en-US" sz="2000" b="0" i="1" u="none" strike="noStrike" cap="none" normalizeH="0" baseline="0" dirty="0" smtClean="0">
-                <a:ln>
-                  <a:noFill/>
-                </a:ln>
-                <a:solidFill>
-                  <a:srgbClr val="629755"/>
-                </a:solidFill>
-                <a:effectLst/>
-                <a:latin typeface="Courier New" panose="02070309020205020404" pitchFamily="49" charset="0"/>
-                <a:cs typeface="Courier New" panose="02070309020205020404" pitchFamily="49" charset="0"/>
-              </a:rPr>
-              <a:t>     */</a:t>
-            </a:r>
-            <a:br>
-              <a:rPr kumimoji="0" lang="en-US" altLang="en-US" sz="2000" b="0" i="1" u="none" strike="noStrike" cap="none" normalizeH="0" baseline="0" dirty="0" smtClean="0">
-                <a:ln>
-                  <a:noFill/>
-                </a:ln>
-                <a:solidFill>
-                  <a:srgbClr val="629755"/>
-                </a:solidFill>
-                <a:effectLst/>
-                <a:latin typeface="Courier New" panose="02070309020205020404" pitchFamily="49" charset="0"/>
-                <a:cs typeface="Courier New" panose="02070309020205020404" pitchFamily="49" charset="0"/>
-              </a:rPr>
-            </a:br>
-            <a:r>
-              <a:rPr kumimoji="0" lang="en-US" altLang="en-US" sz="2000" b="0" i="1" u="none" strike="noStrike" cap="none" normalizeH="0" baseline="0" dirty="0" smtClean="0">
-                <a:ln>
-                  <a:noFill/>
-                </a:ln>
-                <a:solidFill>
-                  <a:srgbClr val="629755"/>
-                </a:solidFill>
-                <a:effectLst/>
-                <a:latin typeface="Courier New" panose="02070309020205020404" pitchFamily="49" charset="0"/>
-                <a:cs typeface="Courier New" panose="02070309020205020404" pitchFamily="49" charset="0"/>
-              </a:rPr>
-              <a:t>    </a:t>
-            </a:r>
-            <a:r>
-              <a:rPr kumimoji="0" lang="en-US" altLang="en-US" sz="2000" b="0" i="0" u="none" strike="noStrike" cap="none" normalizeH="0" baseline="0" dirty="0" smtClean="0">
-                <a:ln>
-                  <a:noFill/>
-                </a:ln>
-                <a:solidFill>
-                  <a:srgbClr val="CC7832"/>
-                </a:solidFill>
-                <a:effectLst/>
-                <a:latin typeface="Courier New" panose="02070309020205020404" pitchFamily="49" charset="0"/>
-                <a:cs typeface="Courier New" panose="02070309020205020404" pitchFamily="49" charset="0"/>
-              </a:rPr>
-              <a:t>companion object</a:t>
-            </a:r>
-            <a:br>
-              <a:rPr kumimoji="0" lang="en-US" altLang="en-US" sz="2000" b="0" i="0" u="none" strike="noStrike" cap="none" normalizeH="0" baseline="0" dirty="0" smtClean="0">
-                <a:ln>
-                  <a:noFill/>
-                </a:ln>
-                <a:solidFill>
-                  <a:srgbClr val="CC7832"/>
-                </a:solidFill>
-                <a:effectLst/>
-                <a:latin typeface="Courier New" panose="02070309020205020404" pitchFamily="49" charset="0"/>
-                <a:cs typeface="Courier New" panose="02070309020205020404" pitchFamily="49" charset="0"/>
-              </a:rPr>
-            </a:br>
-            <a:r>
-              <a:rPr kumimoji="0" lang="en-US" altLang="en-US" sz="2000" b="0" i="0" u="none" strike="noStrike" cap="none" normalizeH="0" baseline="0" dirty="0" smtClean="0">
-                <a:ln>
-                  <a:noFill/>
-                </a:ln>
-                <a:solidFill>
-                  <a:srgbClr val="CC7832"/>
-                </a:solidFill>
-                <a:effectLst/>
-                <a:latin typeface="Courier New" panose="02070309020205020404" pitchFamily="49" charset="0"/>
-                <a:cs typeface="Courier New" panose="02070309020205020404" pitchFamily="49" charset="0"/>
-              </a:rPr>
-              <a:t>    </a:t>
-            </a:r>
-            <a:r>
-              <a:rPr kumimoji="0" lang="en-US" altLang="en-US" sz="2000" b="0" i="0" u="none" strike="noStrike" cap="none" normalizeH="0" baseline="0" dirty="0" smtClean="0">
-                <a:ln>
-                  <a:noFill/>
-                </a:ln>
-                <a:solidFill>
-                  <a:srgbClr val="A9B7C6"/>
-                </a:solidFill>
-                <a:effectLst/>
-                <a:latin typeface="Courier New" panose="02070309020205020404" pitchFamily="49" charset="0"/>
-                <a:cs typeface="Courier New" panose="02070309020205020404" pitchFamily="49" charset="0"/>
-              </a:rPr>
-              <a:t>{</a:t>
-            </a:r>
-            <a:br>
-              <a:rPr kumimoji="0" lang="en-US" altLang="en-US" sz="2000" b="0" i="0" u="none" strike="noStrike" cap="none" normalizeH="0" baseline="0" dirty="0" smtClean="0">
-                <a:ln>
-                  <a:noFill/>
-                </a:ln>
-                <a:solidFill>
-                  <a:srgbClr val="A9B7C6"/>
-                </a:solidFill>
-                <a:effectLst/>
-                <a:latin typeface="Courier New" panose="02070309020205020404" pitchFamily="49" charset="0"/>
-                <a:cs typeface="Courier New" panose="02070309020205020404" pitchFamily="49" charset="0"/>
-              </a:rPr>
-            </a:br>
-            <a:r>
-              <a:rPr kumimoji="0" lang="en-US" altLang="en-US" sz="2000" b="0" i="0" u="none" strike="noStrike" cap="none" normalizeH="0" baseline="0" dirty="0" smtClean="0">
-                <a:ln>
-                  <a:noFill/>
-                </a:ln>
-                <a:solidFill>
-                  <a:srgbClr val="A9B7C6"/>
-                </a:solidFill>
-                <a:effectLst/>
-                <a:latin typeface="Courier New" panose="02070309020205020404" pitchFamily="49" charset="0"/>
-                <a:cs typeface="Courier New" panose="02070309020205020404" pitchFamily="49" charset="0"/>
-              </a:rPr>
-              <a:t>        </a:t>
-            </a:r>
-            <a:r>
-              <a:rPr kumimoji="0" lang="en-US" altLang="en-US" sz="2000" b="0" i="0" u="none" strike="noStrike" cap="none" normalizeH="0" baseline="0" dirty="0" err="1" smtClean="0">
-                <a:ln>
-                  <a:noFill/>
-                </a:ln>
-                <a:solidFill>
-                  <a:srgbClr val="CC7832"/>
-                </a:solidFill>
-                <a:effectLst/>
-                <a:latin typeface="Courier New" panose="02070309020205020404" pitchFamily="49" charset="0"/>
-                <a:cs typeface="Courier New" panose="02070309020205020404" pitchFamily="49" charset="0"/>
-              </a:rPr>
-              <a:t>const</a:t>
-            </a:r>
-            <a:r>
-              <a:rPr kumimoji="0" lang="en-US" altLang="en-US" sz="2000" b="0" i="0" u="none" strike="noStrike" cap="none" normalizeH="0" baseline="0" dirty="0" smtClean="0">
-                <a:ln>
-                  <a:noFill/>
-                </a:ln>
-                <a:solidFill>
-                  <a:srgbClr val="CC7832"/>
-                </a:solidFill>
-                <a:effectLst/>
-                <a:latin typeface="Courier New" panose="02070309020205020404" pitchFamily="49" charset="0"/>
-                <a:cs typeface="Courier New" panose="02070309020205020404" pitchFamily="49" charset="0"/>
-              </a:rPr>
-              <a:t> </a:t>
-            </a:r>
-            <a:r>
-              <a:rPr kumimoji="0" lang="en-US" altLang="en-US" sz="2000" b="0" i="0" u="none" strike="noStrike" cap="none" normalizeH="0" baseline="0" dirty="0" err="1" smtClean="0">
-                <a:ln>
-                  <a:noFill/>
-                </a:ln>
-                <a:solidFill>
-                  <a:srgbClr val="CC7832"/>
-                </a:solidFill>
-                <a:effectLst/>
-                <a:latin typeface="Courier New" panose="02070309020205020404" pitchFamily="49" charset="0"/>
-                <a:cs typeface="Courier New" panose="02070309020205020404" pitchFamily="49" charset="0"/>
-              </a:rPr>
-              <a:t>val</a:t>
-            </a:r>
-            <a:r>
-              <a:rPr kumimoji="0" lang="en-US" altLang="en-US" sz="2000" b="0" i="0" u="none" strike="noStrike" cap="none" normalizeH="0" baseline="0" dirty="0" smtClean="0">
-                <a:ln>
-                  <a:noFill/>
-                </a:ln>
-                <a:solidFill>
-                  <a:srgbClr val="CC7832"/>
-                </a:solidFill>
-                <a:effectLst/>
-                <a:latin typeface="Courier New" panose="02070309020205020404" pitchFamily="49" charset="0"/>
-                <a:cs typeface="Courier New" panose="02070309020205020404" pitchFamily="49" charset="0"/>
-              </a:rPr>
-              <a:t> </a:t>
-            </a:r>
-            <a:r>
-              <a:rPr kumimoji="0" lang="en-US" altLang="en-US" sz="2000" b="0" i="0" u="none" strike="noStrike" cap="none" normalizeH="0" baseline="0" dirty="0" err="1" smtClean="0">
-                <a:ln>
-                  <a:noFill/>
-                </a:ln>
-                <a:solidFill>
-                  <a:srgbClr val="9876AA"/>
-                </a:solidFill>
-                <a:effectLst/>
-                <a:latin typeface="Courier New" panose="02070309020205020404" pitchFamily="49" charset="0"/>
-                <a:cs typeface="Courier New" panose="02070309020205020404" pitchFamily="49" charset="0"/>
-              </a:rPr>
-              <a:t>RandomSeed</a:t>
-            </a:r>
-            <a:r>
-              <a:rPr kumimoji="0" lang="en-US" altLang="en-US" sz="2000" b="0" i="0" u="none" strike="noStrike" cap="none" normalizeH="0" baseline="0" dirty="0" smtClean="0">
-                <a:ln>
-                  <a:noFill/>
-                </a:ln>
-                <a:solidFill>
-                  <a:srgbClr val="A9B7C6"/>
-                </a:solidFill>
-                <a:effectLst/>
-                <a:latin typeface="Courier New" panose="02070309020205020404" pitchFamily="49" charset="0"/>
-                <a:cs typeface="Courier New" panose="02070309020205020404" pitchFamily="49" charset="0"/>
-              </a:rPr>
-              <a:t>: Long = </a:t>
-            </a:r>
-            <a:r>
-              <a:rPr kumimoji="0" lang="en-US" altLang="en-US" sz="2000" b="0" i="0" u="none" strike="noStrike" cap="none" normalizeH="0" baseline="0" dirty="0" smtClean="0">
-                <a:ln>
-                  <a:noFill/>
-                </a:ln>
-                <a:solidFill>
-                  <a:srgbClr val="6897BB"/>
-                </a:solidFill>
-                <a:effectLst/>
-                <a:latin typeface="Courier New" panose="02070309020205020404" pitchFamily="49" charset="0"/>
-                <a:cs typeface="Courier New" panose="02070309020205020404" pitchFamily="49" charset="0"/>
-              </a:rPr>
-              <a:t>5</a:t>
-            </a:r>
-            <a:br>
-              <a:rPr kumimoji="0" lang="en-US" altLang="en-US" sz="2000" b="0" i="0" u="none" strike="noStrike" cap="none" normalizeH="0" baseline="0" dirty="0" smtClean="0">
-                <a:ln>
-                  <a:noFill/>
-                </a:ln>
-                <a:solidFill>
-                  <a:srgbClr val="6897BB"/>
-                </a:solidFill>
-                <a:effectLst/>
-                <a:latin typeface="Courier New" panose="02070309020205020404" pitchFamily="49" charset="0"/>
-                <a:cs typeface="Courier New" panose="02070309020205020404" pitchFamily="49" charset="0"/>
-              </a:rPr>
-            </a:br>
-            <a:r>
-              <a:rPr kumimoji="0" lang="en-US" altLang="en-US" sz="2000" b="0" i="0" u="none" strike="noStrike" cap="none" normalizeH="0" baseline="0" dirty="0" smtClean="0">
-                <a:ln>
-                  <a:noFill/>
-                </a:ln>
-                <a:solidFill>
-                  <a:srgbClr val="6897BB"/>
-                </a:solidFill>
-                <a:effectLst/>
-                <a:latin typeface="Courier New" panose="02070309020205020404" pitchFamily="49" charset="0"/>
-                <a:cs typeface="Courier New" panose="02070309020205020404" pitchFamily="49" charset="0"/>
-              </a:rPr>
-              <a:t>    </a:t>
-            </a:r>
-            <a:r>
-              <a:rPr kumimoji="0" lang="en-US" altLang="en-US" sz="2000" b="0" i="0" u="none" strike="noStrike" cap="none" normalizeH="0" baseline="0" dirty="0" smtClean="0">
-                <a:ln>
-                  <a:noFill/>
-                </a:ln>
-                <a:solidFill>
-                  <a:srgbClr val="A9B7C6"/>
-                </a:solidFill>
-                <a:effectLst/>
-                <a:latin typeface="Courier New" panose="02070309020205020404" pitchFamily="49" charset="0"/>
-                <a:cs typeface="Courier New" panose="02070309020205020404" pitchFamily="49" charset="0"/>
-              </a:rPr>
-              <a:t>}</a:t>
-            </a:r>
-            <a:br>
-              <a:rPr kumimoji="0" lang="en-US" altLang="en-US" sz="2000" b="0" i="0" u="none" strike="noStrike" cap="none" normalizeH="0" baseline="0" dirty="0" smtClean="0">
-                <a:ln>
-                  <a:noFill/>
-                </a:ln>
-                <a:solidFill>
-                  <a:srgbClr val="A9B7C6"/>
-                </a:solidFill>
-                <a:effectLst/>
-                <a:latin typeface="Courier New" panose="02070309020205020404" pitchFamily="49" charset="0"/>
-                <a:cs typeface="Courier New" panose="02070309020205020404" pitchFamily="49" charset="0"/>
-              </a:rPr>
-            </a:br>
-            <a:r>
-              <a:rPr kumimoji="0" lang="en-US" altLang="en-US" sz="2000" b="0" i="0" u="none" strike="noStrike" cap="none" normalizeH="0" baseline="0" dirty="0" smtClean="0">
-                <a:ln>
-                  <a:noFill/>
-                </a:ln>
-                <a:solidFill>
-                  <a:srgbClr val="A9B7C6"/>
-                </a:solidFill>
-                <a:effectLst/>
-                <a:latin typeface="Courier New" panose="02070309020205020404" pitchFamily="49" charset="0"/>
-                <a:cs typeface="Courier New" panose="02070309020205020404" pitchFamily="49" charset="0"/>
-              </a:rPr>
-              <a:t/>
-            </a:r>
-            <a:br>
-              <a:rPr kumimoji="0" lang="en-US" altLang="en-US" sz="2000" b="0" i="0" u="none" strike="noStrike" cap="none" normalizeH="0" baseline="0" dirty="0" smtClean="0">
-                <a:ln>
-                  <a:noFill/>
-                </a:ln>
-                <a:solidFill>
-                  <a:srgbClr val="A9B7C6"/>
-                </a:solidFill>
-                <a:effectLst/>
-                <a:latin typeface="Courier New" panose="02070309020205020404" pitchFamily="49" charset="0"/>
-                <a:cs typeface="Courier New" panose="02070309020205020404" pitchFamily="49" charset="0"/>
-              </a:rPr>
-            </a:br>
-            <a:r>
-              <a:rPr kumimoji="0" lang="en-US" altLang="en-US" sz="2000" b="0" i="0" u="none" strike="noStrike" cap="none" normalizeH="0" baseline="0" dirty="0" smtClean="0">
-                <a:ln>
-                  <a:noFill/>
-                </a:ln>
-                <a:solidFill>
-                  <a:srgbClr val="A9B7C6"/>
-                </a:solidFill>
-                <a:effectLst/>
-                <a:latin typeface="Courier New" panose="02070309020205020404" pitchFamily="49" charset="0"/>
-                <a:cs typeface="Courier New" panose="02070309020205020404" pitchFamily="49" charset="0"/>
-              </a:rPr>
-              <a:t>    </a:t>
-            </a:r>
-            <a:r>
-              <a:rPr kumimoji="0" lang="en-US" altLang="en-US" sz="2000" b="0" i="0" u="none" strike="noStrike" cap="none" normalizeH="0" baseline="0" dirty="0" smtClean="0">
-                <a:ln>
-                  <a:noFill/>
-                </a:ln>
-                <a:solidFill>
-                  <a:srgbClr val="808080"/>
-                </a:solidFill>
-                <a:effectLst/>
-                <a:latin typeface="Courier New" panose="02070309020205020404" pitchFamily="49" charset="0"/>
-                <a:cs typeface="Courier New" panose="02070309020205020404" pitchFamily="49" charset="0"/>
-              </a:rPr>
-              <a:t>//------------------------------------------------------------------------</a:t>
-            </a:r>
-            <a:br>
-              <a:rPr kumimoji="0" lang="en-US" altLang="en-US" sz="2000" b="0" i="0" u="none" strike="noStrike" cap="none" normalizeH="0" baseline="0" dirty="0" smtClean="0">
-                <a:ln>
-                  <a:noFill/>
-                </a:ln>
-                <a:solidFill>
-                  <a:srgbClr val="808080"/>
-                </a:solidFill>
-                <a:effectLst/>
-                <a:latin typeface="Courier New" panose="02070309020205020404" pitchFamily="49" charset="0"/>
-                <a:cs typeface="Courier New" panose="02070309020205020404" pitchFamily="49" charset="0"/>
-              </a:rPr>
-            </a:br>
-            <a:r>
-              <a:rPr kumimoji="0" lang="en-US" altLang="en-US" sz="2000" b="0" i="0" u="none" strike="noStrike" cap="none" normalizeH="0" baseline="0" dirty="0" smtClean="0">
-                <a:ln>
-                  <a:noFill/>
-                </a:ln>
-                <a:solidFill>
-                  <a:srgbClr val="808080"/>
-                </a:solidFill>
-                <a:effectLst/>
-                <a:latin typeface="Courier New" panose="02070309020205020404" pitchFamily="49" charset="0"/>
-                <a:cs typeface="Courier New" panose="02070309020205020404" pitchFamily="49" charset="0"/>
-              </a:rPr>
-              <a:t>    //  DATA MEMBERS</a:t>
-            </a:r>
-            <a:br>
-              <a:rPr kumimoji="0" lang="en-US" altLang="en-US" sz="2000" b="0" i="0" u="none" strike="noStrike" cap="none" normalizeH="0" baseline="0" dirty="0" smtClean="0">
-                <a:ln>
-                  <a:noFill/>
-                </a:ln>
-                <a:solidFill>
-                  <a:srgbClr val="808080"/>
-                </a:solidFill>
-                <a:effectLst/>
-                <a:latin typeface="Courier New" panose="02070309020205020404" pitchFamily="49" charset="0"/>
-                <a:cs typeface="Courier New" panose="02070309020205020404" pitchFamily="49" charset="0"/>
-              </a:rPr>
-            </a:br>
-            <a:r>
-              <a:rPr kumimoji="0" lang="en-US" altLang="en-US" sz="2000" b="0" i="0" u="none" strike="noStrike" cap="none" normalizeH="0" baseline="0" dirty="0" smtClean="0">
-                <a:ln>
-                  <a:noFill/>
-                </a:ln>
-                <a:solidFill>
-                  <a:srgbClr val="808080"/>
-                </a:solidFill>
-                <a:effectLst/>
-                <a:latin typeface="Courier New" panose="02070309020205020404" pitchFamily="49" charset="0"/>
-                <a:cs typeface="Courier New" panose="02070309020205020404" pitchFamily="49" charset="0"/>
-              </a:rPr>
-              <a:t>    //------------------------------------------------------------------------</a:t>
-            </a:r>
-            <a:br>
-              <a:rPr kumimoji="0" lang="en-US" altLang="en-US" sz="2000" b="0" i="0" u="none" strike="noStrike" cap="none" normalizeH="0" baseline="0" dirty="0" smtClean="0">
-                <a:ln>
-                  <a:noFill/>
-                </a:ln>
-                <a:solidFill>
-                  <a:srgbClr val="808080"/>
-                </a:solidFill>
-                <a:effectLst/>
-                <a:latin typeface="Courier New" panose="02070309020205020404" pitchFamily="49" charset="0"/>
-                <a:cs typeface="Courier New" panose="02070309020205020404" pitchFamily="49" charset="0"/>
-              </a:rPr>
-            </a:br>
-            <a:r>
-              <a:rPr kumimoji="0" lang="en-US" altLang="en-US" sz="2000" b="0" i="0" u="none" strike="noStrike" cap="none" normalizeH="0" baseline="0" dirty="0" smtClean="0">
-                <a:ln>
-                  <a:noFill/>
-                </a:ln>
-                <a:solidFill>
-                  <a:srgbClr val="808080"/>
-                </a:solidFill>
-                <a:effectLst/>
-                <a:latin typeface="Courier New" panose="02070309020205020404" pitchFamily="49" charset="0"/>
-                <a:cs typeface="Courier New" panose="02070309020205020404" pitchFamily="49" charset="0"/>
-              </a:rPr>
-              <a:t>    </a:t>
-            </a:r>
-            <a:r>
-              <a:rPr kumimoji="0" lang="en-US" altLang="en-US" sz="2000" b="0" i="1" u="none" strike="noStrike" cap="none" normalizeH="0" baseline="0" dirty="0" smtClean="0">
-                <a:ln>
-                  <a:noFill/>
-                </a:ln>
-                <a:solidFill>
-                  <a:srgbClr val="629755"/>
-                </a:solidFill>
-                <a:effectLst/>
-                <a:latin typeface="Courier New" panose="02070309020205020404" pitchFamily="49" charset="0"/>
-                <a:cs typeface="Courier New" panose="02070309020205020404" pitchFamily="49" charset="0"/>
-              </a:rPr>
-              <a:t>/**</a:t>
-            </a:r>
-            <a:br>
-              <a:rPr kumimoji="0" lang="en-US" altLang="en-US" sz="2000" b="0" i="1" u="none" strike="noStrike" cap="none" normalizeH="0" baseline="0" dirty="0" smtClean="0">
-                <a:ln>
-                  <a:noFill/>
-                </a:ln>
-                <a:solidFill>
-                  <a:srgbClr val="629755"/>
-                </a:solidFill>
-                <a:effectLst/>
-                <a:latin typeface="Courier New" panose="02070309020205020404" pitchFamily="49" charset="0"/>
-                <a:cs typeface="Courier New" panose="02070309020205020404" pitchFamily="49" charset="0"/>
-              </a:rPr>
-            </a:br>
-            <a:r>
-              <a:rPr kumimoji="0" lang="en-US" altLang="en-US" sz="2000" b="0" i="1" u="none" strike="noStrike" cap="none" normalizeH="0" baseline="0" dirty="0" smtClean="0">
-                <a:ln>
-                  <a:noFill/>
-                </a:ln>
-                <a:solidFill>
-                  <a:srgbClr val="629755"/>
-                </a:solidFill>
-                <a:effectLst/>
-                <a:latin typeface="Courier New" panose="02070309020205020404" pitchFamily="49" charset="0"/>
-                <a:cs typeface="Courier New" panose="02070309020205020404" pitchFamily="49" charset="0"/>
-              </a:rPr>
-              <a:t>     * The next message id to use.</a:t>
-            </a:r>
-            <a:br>
-              <a:rPr kumimoji="0" lang="en-US" altLang="en-US" sz="2000" b="0" i="1" u="none" strike="noStrike" cap="none" normalizeH="0" baseline="0" dirty="0" smtClean="0">
-                <a:ln>
-                  <a:noFill/>
-                </a:ln>
-                <a:solidFill>
-                  <a:srgbClr val="629755"/>
-                </a:solidFill>
-                <a:effectLst/>
-                <a:latin typeface="Courier New" panose="02070309020205020404" pitchFamily="49" charset="0"/>
-                <a:cs typeface="Courier New" panose="02070309020205020404" pitchFamily="49" charset="0"/>
-              </a:rPr>
-            </a:br>
-            <a:r>
-              <a:rPr kumimoji="0" lang="en-US" altLang="en-US" sz="2000" b="0" i="1" u="none" strike="noStrike" cap="none" normalizeH="0" baseline="0" dirty="0" smtClean="0">
-                <a:ln>
-                  <a:noFill/>
-                </a:ln>
-                <a:solidFill>
-                  <a:srgbClr val="629755"/>
-                </a:solidFill>
-                <a:effectLst/>
-                <a:latin typeface="Courier New" panose="02070309020205020404" pitchFamily="49" charset="0"/>
-                <a:cs typeface="Courier New" panose="02070309020205020404" pitchFamily="49" charset="0"/>
-              </a:rPr>
-              <a:t>     */</a:t>
-            </a:r>
-            <a:br>
-              <a:rPr kumimoji="0" lang="en-US" altLang="en-US" sz="2000" b="0" i="1" u="none" strike="noStrike" cap="none" normalizeH="0" baseline="0" dirty="0" smtClean="0">
-                <a:ln>
-                  <a:noFill/>
-                </a:ln>
-                <a:solidFill>
-                  <a:srgbClr val="629755"/>
-                </a:solidFill>
-                <a:effectLst/>
-                <a:latin typeface="Courier New" panose="02070309020205020404" pitchFamily="49" charset="0"/>
-                <a:cs typeface="Courier New" panose="02070309020205020404" pitchFamily="49" charset="0"/>
-              </a:rPr>
-            </a:br>
-            <a:r>
-              <a:rPr kumimoji="0" lang="en-US" altLang="en-US" sz="2000" b="0" i="1" u="none" strike="noStrike" cap="none" normalizeH="0" baseline="0" dirty="0" smtClean="0">
-                <a:ln>
-                  <a:noFill/>
-                </a:ln>
-                <a:solidFill>
-                  <a:srgbClr val="629755"/>
-                </a:solidFill>
-                <a:effectLst/>
-                <a:latin typeface="Courier New" panose="02070309020205020404" pitchFamily="49" charset="0"/>
-                <a:cs typeface="Courier New" panose="02070309020205020404" pitchFamily="49" charset="0"/>
-              </a:rPr>
-              <a:t>    </a:t>
-            </a:r>
-            <a:r>
-              <a:rPr kumimoji="0" lang="en-US" altLang="en-US" sz="2000" b="0" i="0" u="none" strike="noStrike" cap="none" normalizeH="0" baseline="0" dirty="0" err="1" smtClean="0">
-                <a:ln>
-                  <a:noFill/>
-                </a:ln>
-                <a:solidFill>
-                  <a:srgbClr val="CC7832"/>
-                </a:solidFill>
-                <a:effectLst/>
-                <a:latin typeface="Courier New" panose="02070309020205020404" pitchFamily="49" charset="0"/>
-                <a:cs typeface="Courier New" panose="02070309020205020404" pitchFamily="49" charset="0"/>
-              </a:rPr>
-              <a:t>var</a:t>
-            </a:r>
-            <a:r>
-              <a:rPr kumimoji="0" lang="en-US" altLang="en-US" sz="2000" b="0" i="0" u="none" strike="noStrike" cap="none" normalizeH="0" baseline="0" dirty="0" smtClean="0">
-                <a:ln>
-                  <a:noFill/>
-                </a:ln>
-                <a:solidFill>
-                  <a:srgbClr val="CC7832"/>
-                </a:solidFill>
-                <a:effectLst/>
-                <a:latin typeface="Courier New" panose="02070309020205020404" pitchFamily="49" charset="0"/>
-                <a:cs typeface="Courier New" panose="02070309020205020404" pitchFamily="49" charset="0"/>
-              </a:rPr>
-              <a:t> </a:t>
-            </a:r>
-            <a:r>
-              <a:rPr kumimoji="0" lang="en-US" altLang="en-US" sz="2000" b="0" i="0" u="none" strike="noStrike" cap="none" normalizeH="0" baseline="0" dirty="0" err="1" smtClean="0">
-                <a:ln>
-                  <a:noFill/>
-                </a:ln>
-                <a:solidFill>
-                  <a:srgbClr val="9876AA"/>
-                </a:solidFill>
-                <a:effectLst/>
-                <a:latin typeface="Courier New" panose="02070309020205020404" pitchFamily="49" charset="0"/>
-                <a:cs typeface="Courier New" panose="02070309020205020404" pitchFamily="49" charset="0"/>
-              </a:rPr>
-              <a:t>nextMessageId</a:t>
-            </a:r>
-            <a:r>
-              <a:rPr kumimoji="0" lang="en-US" altLang="en-US" sz="2000" b="0" i="0" u="none" strike="noStrike" cap="none" normalizeH="0" baseline="0" dirty="0" smtClean="0">
-                <a:ln>
-                  <a:noFill/>
-                </a:ln>
-                <a:solidFill>
-                  <a:srgbClr val="A9B7C6"/>
-                </a:solidFill>
-                <a:effectLst/>
-                <a:latin typeface="Courier New" panose="02070309020205020404" pitchFamily="49" charset="0"/>
-                <a:cs typeface="Courier New" panose="02070309020205020404" pitchFamily="49" charset="0"/>
-              </a:rPr>
-              <a:t>: Long = </a:t>
-            </a:r>
-            <a:r>
-              <a:rPr kumimoji="0" lang="en-US" altLang="en-US" sz="2000" b="0" i="0" u="none" strike="noStrike" cap="none" normalizeH="0" baseline="0" dirty="0" smtClean="0">
-                <a:ln>
-                  <a:noFill/>
-                </a:ln>
-                <a:solidFill>
-                  <a:srgbClr val="6897BB"/>
-                </a:solidFill>
-                <a:effectLst/>
-                <a:latin typeface="Courier New" panose="02070309020205020404" pitchFamily="49" charset="0"/>
-                <a:cs typeface="Courier New" panose="02070309020205020404" pitchFamily="49" charset="0"/>
-              </a:rPr>
-              <a:t>0</a:t>
-            </a:r>
-            <a:endParaRPr kumimoji="0" lang="en-US" altLang="en-US" sz="4800" b="0" i="0" u="none" strike="noStrike" cap="none" normalizeH="0" baseline="0" dirty="0" smtClean="0">
-              <a:ln>
-                <a:noFill/>
-              </a:ln>
-              <a:solidFill>
-                <a:schemeClr val="tx1"/>
-              </a:solidFill>
-              <a:effectLst/>
-              <a:latin typeface="Arial" panose="020B0604020202020204" pitchFamily="34" charset="0"/>
-            </a:endParaRPr>
+            <a:r>
+              <a:rPr lang="en-US" sz="8000" dirty="0" smtClean="0"/>
+              <a:t>Java</a:t>
+            </a:r>
+            <a:endParaRPr lang="en-US" sz="8000" dirty="0"/>
+          </a:p>
+        </p:txBody>
+      </p:sp>
+      <p:sp>
+        <p:nvSpPr>
+          <p:cNvPr id="9" name="Right Arrow 8"/>
+          <p:cNvSpPr/>
+          <p:nvPr/>
+        </p:nvSpPr>
+        <p:spPr>
+          <a:xfrm>
+            <a:off x="3657600" y="2767485"/>
+            <a:ext cx="1981200" cy="1143000"/>
+          </a:xfrm>
+          <a:prstGeom prst="rightArrow">
+            <a:avLst/>
+          </a:prstGeom>
+        </p:spPr>
+        <p:style>
+          <a:lnRef idx="2">
+            <a:schemeClr val="accent1">
+              <a:shade val="50000"/>
+            </a:schemeClr>
+          </a:lnRef>
+          <a:fillRef idx="1">
+            <a:schemeClr val="accent1"/>
+          </a:fillRef>
+          <a:effectRef idx="0">
+            <a:schemeClr val="accent1"/>
+          </a:effectRef>
+          <a:fontRef idx="minor">
+            <a:schemeClr val="lt1"/>
+          </a:fontRef>
+        </p:style>
+        <p:txBody>
+          <a:bodyPr rtlCol="0" anchor="ctr"/>
+          <a:lstStyle/>
+          <a:p>
+            <a:pPr algn="ctr"/>
+            <a:endParaRPr lang="en-US"/>
           </a:p>
         </p:txBody>
       </p:sp>
     </p:spTree>
     <p:extLst>
       <p:ext uri="{BB962C8B-B14F-4D97-AF65-F5344CB8AC3E}">
-        <p14:creationId xmlns:p14="http://schemas.microsoft.com/office/powerpoint/2010/main" val="3183242941"/>
+        <p14:creationId xmlns:p14="http://schemas.microsoft.com/office/powerpoint/2010/main" val="456653722"/>
+      </p:ext>
+    </p:extLst>
+  </p:cSld>
+  <p:clrMapOvr>
+    <a:masterClrMapping/>
+  </p:clrMapOvr>
+  <p:timing>
+    <p:tnLst>
+      <p:par>
+        <p:cTn id="1" dur="indefinite" restart="never" nodeType="tmRoot"/>
+      </p:par>
+    </p:tnLst>
+  </p:timing>
+</p:sld>
+</file>
+
+<file path=ppt/slides/slide9.xml><?xml version="1.0" encoding="utf-8"?>
+<p:sld xmlns:a="http://schemas.openxmlformats.org/drawingml/2006/main" xmlns:r="http://schemas.openxmlformats.org/officeDocument/2006/relationships" xmlns:p="http://schemas.openxmlformats.org/presentationml/2006/main">
+  <p:cSld>
+    <p:spTree>
+      <p:nvGrpSpPr>
+        <p:cNvPr id="1" name=""/>
+        <p:cNvGrpSpPr/>
+        <p:nvPr/>
+      </p:nvGrpSpPr>
+      <p:grpSpPr>
+        <a:xfrm>
+          <a:off x="0" y="0"/>
+          <a:ext cx="0" cy="0"/>
+          <a:chOff x="0" y="0"/>
+          <a:chExt cx="0" cy="0"/>
+        </a:xfrm>
+      </p:grpSpPr>
+      <p:sp>
+        <p:nvSpPr>
+          <p:cNvPr id="4" name="Slide Number Placeholder 3"/>
+          <p:cNvSpPr>
+            <a:spLocks noGrp="1"/>
+          </p:cNvSpPr>
+          <p:nvPr>
+            <p:ph type="sldNum" sz="quarter" idx="12"/>
+          </p:nvPr>
+        </p:nvSpPr>
+        <p:spPr/>
+        <p:txBody>
+          <a:bodyPr/>
+          <a:lstStyle/>
+          <a:p>
+            <a:fld id="{1DD2B937-2451-42FD-890C-5AA83BEDFA1C}" type="slidenum">
+              <a:rPr lang="en-US" smtClean="0">
+                <a:solidFill>
+                  <a:srgbClr val="EFEFF1">
+                    <a:tint val="75000"/>
+                  </a:srgbClr>
+                </a:solidFill>
+              </a:rPr>
+              <a:pPr/>
+              <a:t>9</a:t>
+            </a:fld>
+            <a:endParaRPr lang="en-US">
+              <a:solidFill>
+                <a:srgbClr val="EFEFF1">
+                  <a:tint val="75000"/>
+                </a:srgbClr>
+              </a:solidFill>
+            </a:endParaRPr>
+          </a:p>
+        </p:txBody>
+      </p:sp>
+      <p:sp>
+        <p:nvSpPr>
+          <p:cNvPr id="6" name="TextBox 5"/>
+          <p:cNvSpPr txBox="1"/>
+          <p:nvPr/>
+        </p:nvSpPr>
+        <p:spPr>
+          <a:xfrm>
+            <a:off x="4293" y="2209800"/>
+            <a:ext cx="9144000" cy="3693319"/>
+          </a:xfrm>
+          <a:prstGeom prst="rect">
+            <a:avLst/>
+          </a:prstGeom>
+          <a:noFill/>
+        </p:spPr>
+        <p:txBody>
+          <a:bodyPr wrap="square" rtlCol="0" anchor="ctr">
+            <a:spAutoFit/>
+          </a:bodyPr>
+          <a:lstStyle/>
+          <a:p>
+            <a:pPr algn="ctr">
+              <a:lnSpc>
+                <a:spcPct val="150000"/>
+              </a:lnSpc>
+            </a:pPr>
+            <a:r>
+              <a:rPr lang="en-US" sz="5400" dirty="0" smtClean="0">
+                <a:solidFill>
+                  <a:srgbClr val="EFEFF1"/>
+                </a:solidFill>
+              </a:rPr>
+              <a:t>Thank You</a:t>
+            </a:r>
+            <a:endParaRPr lang="en-US" sz="5400" dirty="0">
+              <a:solidFill>
+                <a:srgbClr val="EFEFF1"/>
+              </a:solidFill>
+            </a:endParaRPr>
+          </a:p>
+          <a:p>
+            <a:pPr algn="ctr">
+              <a:lnSpc>
+                <a:spcPct val="150000"/>
+              </a:lnSpc>
+            </a:pPr>
+            <a:endParaRPr lang="en-US" sz="5400" dirty="0" smtClean="0">
+              <a:solidFill>
+                <a:srgbClr val="EFEFF1"/>
+              </a:solidFill>
+            </a:endParaRPr>
+          </a:p>
+          <a:p>
+            <a:pPr algn="ctr">
+              <a:lnSpc>
+                <a:spcPct val="150000"/>
+              </a:lnSpc>
+            </a:pPr>
+            <a:r>
+              <a:rPr lang="en-US" sz="2400" dirty="0" smtClean="0">
+                <a:solidFill>
+                  <a:srgbClr val="EFEFF1"/>
+                </a:solidFill>
+              </a:rPr>
+              <a:t>Questions / Comments? </a:t>
+            </a:r>
+          </a:p>
+          <a:p>
+            <a:pPr algn="ctr">
+              <a:lnSpc>
+                <a:spcPct val="150000"/>
+              </a:lnSpc>
+            </a:pPr>
+            <a:r>
+              <a:rPr lang="en-US" sz="2400" dirty="0" smtClean="0">
+                <a:solidFill>
+                  <a:srgbClr val="EFEFF1"/>
+                </a:solidFill>
+              </a:rPr>
+              <a:t>Contact:  Ian De Silva (</a:t>
+            </a:r>
+            <a:r>
+              <a:rPr lang="en-US" sz="2400" dirty="0" smtClean="0">
+                <a:solidFill>
+                  <a:srgbClr val="EFEFF1"/>
+                </a:solidFill>
+              </a:rPr>
+              <a:t>desilvai@gmail.com; </a:t>
+            </a:r>
+            <a:r>
+              <a:rPr lang="en-US" sz="2400" dirty="0" smtClean="0">
+                <a:solidFill>
+                  <a:srgbClr val="EFEFF1"/>
+                </a:solidFill>
+              </a:rPr>
+              <a:t>@</a:t>
+            </a:r>
+            <a:r>
+              <a:rPr lang="en-US" sz="2400" dirty="0" err="1" smtClean="0">
+                <a:solidFill>
+                  <a:srgbClr val="EFEFF1"/>
+                </a:solidFill>
+              </a:rPr>
+              <a:t>desilvai</a:t>
+            </a:r>
+            <a:r>
+              <a:rPr lang="en-US" sz="2400" dirty="0" smtClean="0">
+                <a:solidFill>
+                  <a:srgbClr val="EFEFF1"/>
+                </a:solidFill>
+              </a:rPr>
+              <a:t>)  </a:t>
+            </a:r>
+            <a:endParaRPr lang="en-US" sz="2000" dirty="0" smtClean="0">
+              <a:solidFill>
+                <a:srgbClr val="EFEFF1"/>
+              </a:solidFill>
+            </a:endParaRPr>
+          </a:p>
+        </p:txBody>
+      </p:sp>
+    </p:spTree>
+    <p:extLst>
+      <p:ext uri="{BB962C8B-B14F-4D97-AF65-F5344CB8AC3E}">
+        <p14:creationId xmlns:p14="http://schemas.microsoft.com/office/powerpoint/2010/main" val="2048846455"/>
       </p:ext>
     </p:extLst>
   </p:cSld>

</xml_diff>